<commit_message>
Added text extraction from tables
</commit_message>
<xml_diff>
--- a/tests/resources/test_files/SampleReport.pptx
+++ b/tests/resources/test_files/SampleReport.pptx
@@ -9,6 +9,7 @@
     <p:sldId id="257" r:id="rId3"/>
     <p:sldId id="258" r:id="rId4"/>
     <p:sldId id="259" r:id="rId5"/>
+    <p:sldId id="260" r:id="rId6"/>
   </p:sldIdLst>
   <p:sldSz cx="12192000" cy="6858000"/>
   <p:notesSz cx="6858000" cy="9144000"/>
@@ -107,6 +108,11 @@
       </a:defRPr>
     </a:lvl9pPr>
   </p:defaultTextStyle>
+  <p:extLst>
+    <p:ext uri="{EFAFB233-063F-42B5-8137-9DF3F51BA10A}">
+      <p15:sldGuideLst xmlns:p15="http://schemas.microsoft.com/office/powerpoint/2012/main"/>
+    </p:ext>
+  </p:extLst>
 </p:presentation>
 </file>
 
@@ -259,7 +265,7 @@
           <a:p>
             <a:fld id="{1AB8EA05-F11B-4924-8C07-98FF9514FB29}" type="datetimeFigureOut">
               <a:rPr lang="en-CA" smtClean="0"/>
-              <a:t>2023-09-19</a:t>
+              <a:t>2023-09-20</a:t>
             </a:fld>
             <a:endParaRPr lang="en-CA"/>
           </a:p>
@@ -459,7 +465,7 @@
           <a:p>
             <a:fld id="{1AB8EA05-F11B-4924-8C07-98FF9514FB29}" type="datetimeFigureOut">
               <a:rPr lang="en-CA" smtClean="0"/>
-              <a:t>2023-09-19</a:t>
+              <a:t>2023-09-20</a:t>
             </a:fld>
             <a:endParaRPr lang="en-CA"/>
           </a:p>
@@ -669,7 +675,7 @@
           <a:p>
             <a:fld id="{1AB8EA05-F11B-4924-8C07-98FF9514FB29}" type="datetimeFigureOut">
               <a:rPr lang="en-CA" smtClean="0"/>
-              <a:t>2023-09-19</a:t>
+              <a:t>2023-09-20</a:t>
             </a:fld>
             <a:endParaRPr lang="en-CA"/>
           </a:p>
@@ -869,7 +875,7 @@
           <a:p>
             <a:fld id="{1AB8EA05-F11B-4924-8C07-98FF9514FB29}" type="datetimeFigureOut">
               <a:rPr lang="en-CA" smtClean="0"/>
-              <a:t>2023-09-19</a:t>
+              <a:t>2023-09-20</a:t>
             </a:fld>
             <a:endParaRPr lang="en-CA"/>
           </a:p>
@@ -1145,7 +1151,7 @@
           <a:p>
             <a:fld id="{1AB8EA05-F11B-4924-8C07-98FF9514FB29}" type="datetimeFigureOut">
               <a:rPr lang="en-CA" smtClean="0"/>
-              <a:t>2023-09-19</a:t>
+              <a:t>2023-09-20</a:t>
             </a:fld>
             <a:endParaRPr lang="en-CA"/>
           </a:p>
@@ -1413,7 +1419,7 @@
           <a:p>
             <a:fld id="{1AB8EA05-F11B-4924-8C07-98FF9514FB29}" type="datetimeFigureOut">
               <a:rPr lang="en-CA" smtClean="0"/>
-              <a:t>2023-09-19</a:t>
+              <a:t>2023-09-20</a:t>
             </a:fld>
             <a:endParaRPr lang="en-CA"/>
           </a:p>
@@ -1828,7 +1834,7 @@
           <a:p>
             <a:fld id="{1AB8EA05-F11B-4924-8C07-98FF9514FB29}" type="datetimeFigureOut">
               <a:rPr lang="en-CA" smtClean="0"/>
-              <a:t>2023-09-19</a:t>
+              <a:t>2023-09-20</a:t>
             </a:fld>
             <a:endParaRPr lang="en-CA"/>
           </a:p>
@@ -1970,7 +1976,7 @@
           <a:p>
             <a:fld id="{1AB8EA05-F11B-4924-8C07-98FF9514FB29}" type="datetimeFigureOut">
               <a:rPr lang="en-CA" smtClean="0"/>
-              <a:t>2023-09-19</a:t>
+              <a:t>2023-09-20</a:t>
             </a:fld>
             <a:endParaRPr lang="en-CA"/>
           </a:p>
@@ -2083,7 +2089,7 @@
           <a:p>
             <a:fld id="{1AB8EA05-F11B-4924-8C07-98FF9514FB29}" type="datetimeFigureOut">
               <a:rPr lang="en-CA" smtClean="0"/>
-              <a:t>2023-09-19</a:t>
+              <a:t>2023-09-20</a:t>
             </a:fld>
             <a:endParaRPr lang="en-CA"/>
           </a:p>
@@ -2396,7 +2402,7 @@
           <a:p>
             <a:fld id="{1AB8EA05-F11B-4924-8C07-98FF9514FB29}" type="datetimeFigureOut">
               <a:rPr lang="en-CA" smtClean="0"/>
-              <a:t>2023-09-19</a:t>
+              <a:t>2023-09-20</a:t>
             </a:fld>
             <a:endParaRPr lang="en-CA"/>
           </a:p>
@@ -2685,7 +2691,7 @@
           <a:p>
             <a:fld id="{1AB8EA05-F11B-4924-8C07-98FF9514FB29}" type="datetimeFigureOut">
               <a:rPr lang="en-CA" smtClean="0"/>
-              <a:t>2023-09-19</a:t>
+              <a:t>2023-09-20</a:t>
             </a:fld>
             <a:endParaRPr lang="en-CA"/>
           </a:p>
@@ -2928,7 +2934,7 @@
           <a:p>
             <a:fld id="{1AB8EA05-F11B-4924-8C07-98FF9514FB29}" type="datetimeFigureOut">
               <a:rPr lang="en-CA" smtClean="0"/>
-              <a:t>2023-09-19</a:t>
+              <a:t>2023-09-20</a:t>
             </a:fld>
             <a:endParaRPr lang="en-CA"/>
           </a:p>
@@ -3396,7 +3402,7 @@
           <a:p>
             <a:r>
               <a:rPr lang="en-CA" dirty="0"/>
-              <a:t>23 March 2023</a:t>
+              <a:t>20 September 2023</a:t>
             </a:r>
           </a:p>
           <a:p>
@@ -6386,2896 +6392,208 @@
           </a:p>
         </p:txBody>
       </p:sp>
-      <p:sp>
-        <p:nvSpPr>
-          <p:cNvPr id="3" name="Content Placeholder 2">
+      <p:graphicFrame>
+        <p:nvGraphicFramePr>
+          <p:cNvPr id="4" name="Table 4">
             <a:extLst>
               <a:ext uri="{FF2B5EF4-FFF2-40B4-BE49-F238E27FC236}">
-                <a16:creationId xmlns:a16="http://schemas.microsoft.com/office/drawing/2014/main" id="{699B73E5-D8C9-C58E-18E9-1742D7332E56}"/>
+                <a16:creationId xmlns:a16="http://schemas.microsoft.com/office/drawing/2014/main" id="{F1E62378-6C9B-0208-0529-C96DC2FEC6A3}"/>
               </a:ext>
             </a:extLst>
           </p:cNvPr>
-          <p:cNvSpPr>
-            <a:spLocks noGrp="1"/>
-          </p:cNvSpPr>
+          <p:cNvGraphicFramePr>
+            <a:graphicFrameLocks noGrp="1"/>
+          </p:cNvGraphicFramePr>
           <p:nvPr>
             <p:ph idx="1"/>
+            <p:extLst>
+              <p:ext uri="{D42A27DB-BD31-4B8C-83A1-F6EECF244321}">
+                <p14:modId xmlns:p14="http://schemas.microsoft.com/office/powerpoint/2010/main" val="3707703410"/>
+              </p:ext>
+            </p:extLst>
           </p:nvPr>
-        </p:nvSpPr>
-        <p:spPr/>
-        <p:txBody>
-          <a:bodyPr/>
-          <a:lstStyle/>
-          <a:p>
-            <a:pPr marL="0" marR="0" algn="just">
-              <a:spcBef>
-                <a:spcPts val="0"/>
-              </a:spcBef>
-              <a:spcAft>
-                <a:spcPts val="1125"/>
-              </a:spcAft>
-            </a:pPr>
-            <a:r>
-              <a:rPr lang="fr-CA" sz="1800" dirty="0" err="1">
-                <a:solidFill>
-                  <a:srgbClr val="000000"/>
-                </a:solidFill>
-                <a:effectLst/>
-                <a:latin typeface="Open Sans" panose="020B0606030504020204" pitchFamily="34" charset="0"/>
-                <a:ea typeface="Times New Roman" panose="02020603050405020304" pitchFamily="18" charset="0"/>
-              </a:rPr>
-              <a:t>Nulla</a:t>
-            </a:r>
-            <a:r>
-              <a:rPr lang="fr-CA" sz="1800" dirty="0">
-                <a:solidFill>
-                  <a:srgbClr val="000000"/>
-                </a:solidFill>
-                <a:effectLst/>
-                <a:latin typeface="Open Sans" panose="020B0606030504020204" pitchFamily="34" charset="0"/>
-                <a:ea typeface="Times New Roman" panose="02020603050405020304" pitchFamily="18" charset="0"/>
-              </a:rPr>
-              <a:t> a </a:t>
-            </a:r>
-            <a:r>
-              <a:rPr lang="fr-CA" sz="1800" dirty="0" err="1">
-                <a:solidFill>
-                  <a:srgbClr val="000000"/>
-                </a:solidFill>
-                <a:effectLst/>
-                <a:latin typeface="Open Sans" panose="020B0606030504020204" pitchFamily="34" charset="0"/>
-                <a:ea typeface="Times New Roman" panose="02020603050405020304" pitchFamily="18" charset="0"/>
-              </a:rPr>
-              <a:t>tincidunt</a:t>
-            </a:r>
-            <a:r>
-              <a:rPr lang="fr-CA" sz="1800" dirty="0">
-                <a:solidFill>
-                  <a:srgbClr val="000000"/>
-                </a:solidFill>
-                <a:effectLst/>
-                <a:latin typeface="Open Sans" panose="020B0606030504020204" pitchFamily="34" charset="0"/>
-                <a:ea typeface="Times New Roman" panose="02020603050405020304" pitchFamily="18" charset="0"/>
-              </a:rPr>
-              <a:t> libero, </a:t>
-            </a:r>
-            <a:r>
-              <a:rPr lang="fr-CA" sz="1800" dirty="0" err="1">
-                <a:solidFill>
-                  <a:srgbClr val="000000"/>
-                </a:solidFill>
-                <a:effectLst/>
-                <a:latin typeface="Open Sans" panose="020B0606030504020204" pitchFamily="34" charset="0"/>
-                <a:ea typeface="Times New Roman" panose="02020603050405020304" pitchFamily="18" charset="0"/>
-              </a:rPr>
-              <a:t>eget</a:t>
-            </a:r>
-            <a:r>
-              <a:rPr lang="fr-CA" sz="1800" dirty="0">
-                <a:solidFill>
-                  <a:srgbClr val="000000"/>
-                </a:solidFill>
-                <a:effectLst/>
-                <a:latin typeface="Open Sans" panose="020B0606030504020204" pitchFamily="34" charset="0"/>
-                <a:ea typeface="Times New Roman" panose="02020603050405020304" pitchFamily="18" charset="0"/>
-              </a:rPr>
-              <a:t> commodo </a:t>
-            </a:r>
-            <a:r>
-              <a:rPr lang="fr-CA" sz="1800" dirty="0" err="1">
-                <a:solidFill>
-                  <a:srgbClr val="000000"/>
-                </a:solidFill>
-                <a:effectLst/>
-                <a:latin typeface="Open Sans" panose="020B0606030504020204" pitchFamily="34" charset="0"/>
-                <a:ea typeface="Times New Roman" panose="02020603050405020304" pitchFamily="18" charset="0"/>
-              </a:rPr>
-              <a:t>risus</a:t>
-            </a:r>
-            <a:r>
-              <a:rPr lang="fr-CA" sz="1800" dirty="0">
-                <a:solidFill>
-                  <a:srgbClr val="000000"/>
-                </a:solidFill>
-                <a:effectLst/>
-                <a:latin typeface="Open Sans" panose="020B0606030504020204" pitchFamily="34" charset="0"/>
-                <a:ea typeface="Times New Roman" panose="02020603050405020304" pitchFamily="18" charset="0"/>
-              </a:rPr>
-              <a:t>. </a:t>
-            </a:r>
-            <a:r>
-              <a:rPr lang="fr-CA" sz="1800" dirty="0" err="1">
-                <a:solidFill>
-                  <a:srgbClr val="000000"/>
-                </a:solidFill>
-                <a:effectLst/>
-                <a:latin typeface="Open Sans" panose="020B0606030504020204" pitchFamily="34" charset="0"/>
-                <a:ea typeface="Times New Roman" panose="02020603050405020304" pitchFamily="18" charset="0"/>
-              </a:rPr>
-              <a:t>Etiam</a:t>
-            </a:r>
-            <a:r>
-              <a:rPr lang="fr-CA" sz="1800" dirty="0">
-                <a:solidFill>
-                  <a:srgbClr val="000000"/>
-                </a:solidFill>
-                <a:effectLst/>
-                <a:latin typeface="Open Sans" panose="020B0606030504020204" pitchFamily="34" charset="0"/>
-                <a:ea typeface="Times New Roman" panose="02020603050405020304" pitchFamily="18" charset="0"/>
-              </a:rPr>
-              <a:t> </a:t>
-            </a:r>
-            <a:r>
-              <a:rPr lang="fr-CA" sz="1800" dirty="0" err="1">
-                <a:solidFill>
-                  <a:srgbClr val="000000"/>
-                </a:solidFill>
-                <a:effectLst/>
-                <a:latin typeface="Open Sans" panose="020B0606030504020204" pitchFamily="34" charset="0"/>
-                <a:ea typeface="Times New Roman" panose="02020603050405020304" pitchFamily="18" charset="0"/>
-              </a:rPr>
-              <a:t>tincidunt</a:t>
-            </a:r>
-            <a:r>
-              <a:rPr lang="fr-CA" sz="1800" dirty="0">
-                <a:solidFill>
-                  <a:srgbClr val="000000"/>
-                </a:solidFill>
-                <a:effectLst/>
-                <a:latin typeface="Open Sans" panose="020B0606030504020204" pitchFamily="34" charset="0"/>
-                <a:ea typeface="Times New Roman" panose="02020603050405020304" pitchFamily="18" charset="0"/>
-              </a:rPr>
-              <a:t> </a:t>
-            </a:r>
-            <a:r>
-              <a:rPr lang="fr-CA" sz="1800" dirty="0" err="1">
-                <a:solidFill>
-                  <a:srgbClr val="000000"/>
-                </a:solidFill>
-                <a:effectLst/>
-                <a:latin typeface="Open Sans" panose="020B0606030504020204" pitchFamily="34" charset="0"/>
-                <a:ea typeface="Times New Roman" panose="02020603050405020304" pitchFamily="18" charset="0"/>
-              </a:rPr>
-              <a:t>ultricies</a:t>
-            </a:r>
-            <a:r>
-              <a:rPr lang="fr-CA" sz="1800" dirty="0">
-                <a:solidFill>
-                  <a:srgbClr val="000000"/>
-                </a:solidFill>
-                <a:effectLst/>
-                <a:latin typeface="Open Sans" panose="020B0606030504020204" pitchFamily="34" charset="0"/>
-                <a:ea typeface="Times New Roman" panose="02020603050405020304" pitchFamily="18" charset="0"/>
-              </a:rPr>
-              <a:t> </a:t>
-            </a:r>
-            <a:r>
-              <a:rPr lang="fr-CA" sz="1800" dirty="0" err="1">
-                <a:solidFill>
-                  <a:srgbClr val="000000"/>
-                </a:solidFill>
-                <a:effectLst/>
-                <a:latin typeface="Open Sans" panose="020B0606030504020204" pitchFamily="34" charset="0"/>
-                <a:ea typeface="Times New Roman" panose="02020603050405020304" pitchFamily="18" charset="0"/>
-              </a:rPr>
-              <a:t>ligula</a:t>
-            </a:r>
-            <a:r>
-              <a:rPr lang="fr-CA" sz="1800" dirty="0">
-                <a:solidFill>
-                  <a:srgbClr val="000000"/>
-                </a:solidFill>
-                <a:effectLst/>
-                <a:latin typeface="Open Sans" panose="020B0606030504020204" pitchFamily="34" charset="0"/>
-                <a:ea typeface="Times New Roman" panose="02020603050405020304" pitchFamily="18" charset="0"/>
-              </a:rPr>
-              <a:t>, </a:t>
-            </a:r>
-            <a:r>
-              <a:rPr lang="fr-CA" sz="1800" dirty="0" err="1">
-                <a:solidFill>
-                  <a:srgbClr val="000000"/>
-                </a:solidFill>
-                <a:effectLst/>
-                <a:latin typeface="Open Sans" panose="020B0606030504020204" pitchFamily="34" charset="0"/>
-                <a:ea typeface="Times New Roman" panose="02020603050405020304" pitchFamily="18" charset="0"/>
-              </a:rPr>
-              <a:t>sit</a:t>
-            </a:r>
-            <a:r>
-              <a:rPr lang="fr-CA" sz="1800" dirty="0">
-                <a:solidFill>
-                  <a:srgbClr val="000000"/>
-                </a:solidFill>
-                <a:effectLst/>
-                <a:latin typeface="Open Sans" panose="020B0606030504020204" pitchFamily="34" charset="0"/>
-                <a:ea typeface="Times New Roman" panose="02020603050405020304" pitchFamily="18" charset="0"/>
-              </a:rPr>
-              <a:t> </a:t>
-            </a:r>
-            <a:r>
-              <a:rPr lang="fr-CA" sz="1800" dirty="0" err="1">
-                <a:solidFill>
-                  <a:srgbClr val="000000"/>
-                </a:solidFill>
-                <a:effectLst/>
-                <a:latin typeface="Open Sans" panose="020B0606030504020204" pitchFamily="34" charset="0"/>
-                <a:ea typeface="Times New Roman" panose="02020603050405020304" pitchFamily="18" charset="0"/>
-              </a:rPr>
-              <a:t>amet</a:t>
-            </a:r>
-            <a:r>
-              <a:rPr lang="fr-CA" sz="1800" dirty="0">
-                <a:solidFill>
-                  <a:srgbClr val="000000"/>
-                </a:solidFill>
-                <a:effectLst/>
-                <a:latin typeface="Open Sans" panose="020B0606030504020204" pitchFamily="34" charset="0"/>
-                <a:ea typeface="Times New Roman" panose="02020603050405020304" pitchFamily="18" charset="0"/>
-              </a:rPr>
-              <a:t> </a:t>
-            </a:r>
-            <a:r>
-              <a:rPr lang="fr-CA" sz="1800" dirty="0" err="1">
-                <a:solidFill>
-                  <a:srgbClr val="000000"/>
-                </a:solidFill>
-                <a:effectLst/>
-                <a:latin typeface="Open Sans" panose="020B0606030504020204" pitchFamily="34" charset="0"/>
-                <a:ea typeface="Times New Roman" panose="02020603050405020304" pitchFamily="18" charset="0"/>
-              </a:rPr>
-              <a:t>egestas</a:t>
-            </a:r>
-            <a:r>
-              <a:rPr lang="fr-CA" sz="1800" dirty="0">
-                <a:solidFill>
-                  <a:srgbClr val="000000"/>
-                </a:solidFill>
-                <a:effectLst/>
-                <a:latin typeface="Open Sans" panose="020B0606030504020204" pitchFamily="34" charset="0"/>
-                <a:ea typeface="Times New Roman" panose="02020603050405020304" pitchFamily="18" charset="0"/>
-              </a:rPr>
-              <a:t> sem. </a:t>
-            </a:r>
-            <a:r>
-              <a:rPr lang="fr-CA" sz="1800" dirty="0" err="1">
-                <a:solidFill>
-                  <a:srgbClr val="000000"/>
-                </a:solidFill>
-                <a:effectLst/>
-                <a:latin typeface="Open Sans" panose="020B0606030504020204" pitchFamily="34" charset="0"/>
-                <a:ea typeface="Times New Roman" panose="02020603050405020304" pitchFamily="18" charset="0"/>
-              </a:rPr>
-              <a:t>Maecenas</a:t>
-            </a:r>
-            <a:r>
-              <a:rPr lang="fr-CA" sz="1800" dirty="0">
-                <a:solidFill>
-                  <a:srgbClr val="000000"/>
-                </a:solidFill>
-                <a:effectLst/>
-                <a:latin typeface="Open Sans" panose="020B0606030504020204" pitchFamily="34" charset="0"/>
-                <a:ea typeface="Times New Roman" panose="02020603050405020304" pitchFamily="18" charset="0"/>
-              </a:rPr>
-              <a:t> </a:t>
-            </a:r>
-            <a:r>
-              <a:rPr lang="fr-CA" sz="1800" dirty="0" err="1">
-                <a:solidFill>
-                  <a:srgbClr val="000000"/>
-                </a:solidFill>
-                <a:effectLst/>
-                <a:latin typeface="Open Sans" panose="020B0606030504020204" pitchFamily="34" charset="0"/>
-                <a:ea typeface="Times New Roman" panose="02020603050405020304" pitchFamily="18" charset="0"/>
-              </a:rPr>
-              <a:t>iaculis</a:t>
-            </a:r>
-            <a:r>
-              <a:rPr lang="fr-CA" sz="1800" dirty="0">
-                <a:solidFill>
-                  <a:srgbClr val="000000"/>
-                </a:solidFill>
-                <a:effectLst/>
-                <a:latin typeface="Open Sans" panose="020B0606030504020204" pitchFamily="34" charset="0"/>
-                <a:ea typeface="Times New Roman" panose="02020603050405020304" pitchFamily="18" charset="0"/>
-              </a:rPr>
-              <a:t> </a:t>
-            </a:r>
-            <a:r>
-              <a:rPr lang="fr-CA" sz="1800" dirty="0" err="1">
-                <a:solidFill>
-                  <a:srgbClr val="000000"/>
-                </a:solidFill>
-                <a:effectLst/>
-                <a:latin typeface="Open Sans" panose="020B0606030504020204" pitchFamily="34" charset="0"/>
-                <a:ea typeface="Times New Roman" panose="02020603050405020304" pitchFamily="18" charset="0"/>
-              </a:rPr>
-              <a:t>sed</a:t>
-            </a:r>
-            <a:r>
-              <a:rPr lang="fr-CA" sz="1800" dirty="0">
-                <a:solidFill>
-                  <a:srgbClr val="000000"/>
-                </a:solidFill>
-                <a:effectLst/>
-                <a:latin typeface="Open Sans" panose="020B0606030504020204" pitchFamily="34" charset="0"/>
-                <a:ea typeface="Times New Roman" panose="02020603050405020304" pitchFamily="18" charset="0"/>
-              </a:rPr>
-              <a:t> </a:t>
-            </a:r>
-            <a:r>
-              <a:rPr lang="fr-CA" sz="1800" dirty="0" err="1">
-                <a:solidFill>
-                  <a:srgbClr val="000000"/>
-                </a:solidFill>
-                <a:effectLst/>
-                <a:latin typeface="Open Sans" panose="020B0606030504020204" pitchFamily="34" charset="0"/>
-                <a:ea typeface="Times New Roman" panose="02020603050405020304" pitchFamily="18" charset="0"/>
-              </a:rPr>
-              <a:t>felis</a:t>
-            </a:r>
-            <a:r>
-              <a:rPr lang="fr-CA" sz="1800" dirty="0">
-                <a:solidFill>
-                  <a:srgbClr val="000000"/>
-                </a:solidFill>
-                <a:effectLst/>
-                <a:latin typeface="Open Sans" panose="020B0606030504020204" pitchFamily="34" charset="0"/>
-                <a:ea typeface="Times New Roman" panose="02020603050405020304" pitchFamily="18" charset="0"/>
-              </a:rPr>
-              <a:t> </a:t>
-            </a:r>
-            <a:r>
-              <a:rPr lang="fr-CA" sz="1800" dirty="0" err="1">
-                <a:solidFill>
-                  <a:srgbClr val="000000"/>
-                </a:solidFill>
-                <a:effectLst/>
-                <a:latin typeface="Open Sans" panose="020B0606030504020204" pitchFamily="34" charset="0"/>
-                <a:ea typeface="Times New Roman" panose="02020603050405020304" pitchFamily="18" charset="0"/>
-              </a:rPr>
-              <a:t>sed</a:t>
-            </a:r>
-            <a:r>
-              <a:rPr lang="fr-CA" sz="1800" dirty="0">
-                <a:solidFill>
-                  <a:srgbClr val="000000"/>
-                </a:solidFill>
-                <a:effectLst/>
-                <a:latin typeface="Open Sans" panose="020B0606030504020204" pitchFamily="34" charset="0"/>
-                <a:ea typeface="Times New Roman" panose="02020603050405020304" pitchFamily="18" charset="0"/>
-              </a:rPr>
-              <a:t> </a:t>
-            </a:r>
-            <a:r>
-              <a:rPr lang="fr-CA" sz="1800" dirty="0" err="1">
-                <a:solidFill>
-                  <a:srgbClr val="000000"/>
-                </a:solidFill>
-                <a:effectLst/>
-                <a:latin typeface="Open Sans" panose="020B0606030504020204" pitchFamily="34" charset="0"/>
-                <a:ea typeface="Times New Roman" panose="02020603050405020304" pitchFamily="18" charset="0"/>
-              </a:rPr>
-              <a:t>pellentesque</a:t>
-            </a:r>
-            <a:r>
-              <a:rPr lang="fr-CA" sz="1800" dirty="0">
-                <a:solidFill>
-                  <a:srgbClr val="000000"/>
-                </a:solidFill>
-                <a:effectLst/>
-                <a:latin typeface="Open Sans" panose="020B0606030504020204" pitchFamily="34" charset="0"/>
-                <a:ea typeface="Times New Roman" panose="02020603050405020304" pitchFamily="18" charset="0"/>
-              </a:rPr>
-              <a:t>. </a:t>
-            </a:r>
-            <a:r>
-              <a:rPr lang="fr-CA" sz="1800" dirty="0" err="1">
-                <a:solidFill>
-                  <a:srgbClr val="000000"/>
-                </a:solidFill>
-                <a:effectLst/>
-                <a:latin typeface="Open Sans" panose="020B0606030504020204" pitchFamily="34" charset="0"/>
-                <a:ea typeface="Times New Roman" panose="02020603050405020304" pitchFamily="18" charset="0"/>
-              </a:rPr>
-              <a:t>Vivamus</a:t>
-            </a:r>
-            <a:r>
-              <a:rPr lang="fr-CA" sz="1800" dirty="0">
-                <a:solidFill>
-                  <a:srgbClr val="000000"/>
-                </a:solidFill>
-                <a:effectLst/>
-                <a:latin typeface="Open Sans" panose="020B0606030504020204" pitchFamily="34" charset="0"/>
-                <a:ea typeface="Times New Roman" panose="02020603050405020304" pitchFamily="18" charset="0"/>
-              </a:rPr>
-              <a:t> non </a:t>
-            </a:r>
-            <a:r>
-              <a:rPr lang="fr-CA" sz="1800" dirty="0" err="1">
-                <a:solidFill>
-                  <a:srgbClr val="000000"/>
-                </a:solidFill>
-                <a:effectLst/>
-                <a:latin typeface="Open Sans" panose="020B0606030504020204" pitchFamily="34" charset="0"/>
-                <a:ea typeface="Times New Roman" panose="02020603050405020304" pitchFamily="18" charset="0"/>
-              </a:rPr>
-              <a:t>vehicula</a:t>
-            </a:r>
-            <a:r>
-              <a:rPr lang="fr-CA" sz="1800" dirty="0">
-                <a:solidFill>
-                  <a:srgbClr val="000000"/>
-                </a:solidFill>
-                <a:effectLst/>
-                <a:latin typeface="Open Sans" panose="020B0606030504020204" pitchFamily="34" charset="0"/>
-                <a:ea typeface="Times New Roman" panose="02020603050405020304" pitchFamily="18" charset="0"/>
-              </a:rPr>
-              <a:t> </a:t>
-            </a:r>
-            <a:r>
-              <a:rPr lang="fr-CA" sz="1800" dirty="0" err="1">
-                <a:solidFill>
-                  <a:srgbClr val="000000"/>
-                </a:solidFill>
-                <a:effectLst/>
-                <a:latin typeface="Open Sans" panose="020B0606030504020204" pitchFamily="34" charset="0"/>
-                <a:ea typeface="Times New Roman" panose="02020603050405020304" pitchFamily="18" charset="0"/>
-              </a:rPr>
-              <a:t>quam</a:t>
-            </a:r>
-            <a:r>
-              <a:rPr lang="fr-CA" sz="1800" dirty="0">
-                <a:solidFill>
-                  <a:srgbClr val="000000"/>
-                </a:solidFill>
-                <a:effectLst/>
-                <a:latin typeface="Open Sans" panose="020B0606030504020204" pitchFamily="34" charset="0"/>
-                <a:ea typeface="Times New Roman" panose="02020603050405020304" pitchFamily="18" charset="0"/>
-              </a:rPr>
-              <a:t>. Cras nunc erat, </a:t>
-            </a:r>
-            <a:r>
-              <a:rPr lang="fr-CA" sz="1800" dirty="0" err="1">
-                <a:solidFill>
-                  <a:srgbClr val="000000"/>
-                </a:solidFill>
-                <a:effectLst/>
-                <a:latin typeface="Open Sans" panose="020B0606030504020204" pitchFamily="34" charset="0"/>
-                <a:ea typeface="Times New Roman" panose="02020603050405020304" pitchFamily="18" charset="0"/>
-              </a:rPr>
-              <a:t>aliquam</a:t>
-            </a:r>
-            <a:r>
-              <a:rPr lang="fr-CA" sz="1800" dirty="0">
-                <a:solidFill>
-                  <a:srgbClr val="000000"/>
-                </a:solidFill>
-                <a:effectLst/>
-                <a:latin typeface="Open Sans" panose="020B0606030504020204" pitchFamily="34" charset="0"/>
-                <a:ea typeface="Times New Roman" panose="02020603050405020304" pitchFamily="18" charset="0"/>
-              </a:rPr>
-              <a:t> </a:t>
-            </a:r>
-            <a:r>
-              <a:rPr lang="fr-CA" sz="1800" dirty="0" err="1">
-                <a:solidFill>
-                  <a:srgbClr val="000000"/>
-                </a:solidFill>
-                <a:effectLst/>
-                <a:latin typeface="Open Sans" panose="020B0606030504020204" pitchFamily="34" charset="0"/>
-                <a:ea typeface="Times New Roman" panose="02020603050405020304" pitchFamily="18" charset="0"/>
-              </a:rPr>
-              <a:t>eget</a:t>
-            </a:r>
-            <a:r>
-              <a:rPr lang="fr-CA" sz="1800" dirty="0">
-                <a:solidFill>
-                  <a:srgbClr val="000000"/>
-                </a:solidFill>
-                <a:effectLst/>
-                <a:latin typeface="Open Sans" panose="020B0606030504020204" pitchFamily="34" charset="0"/>
-                <a:ea typeface="Times New Roman" panose="02020603050405020304" pitchFamily="18" charset="0"/>
-              </a:rPr>
-              <a:t> </a:t>
-            </a:r>
-            <a:r>
-              <a:rPr lang="fr-CA" sz="1800" dirty="0" err="1">
-                <a:solidFill>
-                  <a:srgbClr val="000000"/>
-                </a:solidFill>
-                <a:effectLst/>
-                <a:latin typeface="Open Sans" panose="020B0606030504020204" pitchFamily="34" charset="0"/>
-                <a:ea typeface="Times New Roman" panose="02020603050405020304" pitchFamily="18" charset="0"/>
-              </a:rPr>
-              <a:t>imperdiet</a:t>
-            </a:r>
-            <a:r>
-              <a:rPr lang="fr-CA" sz="1800" dirty="0">
-                <a:solidFill>
-                  <a:srgbClr val="000000"/>
-                </a:solidFill>
-                <a:effectLst/>
-                <a:latin typeface="Open Sans" panose="020B0606030504020204" pitchFamily="34" charset="0"/>
-                <a:ea typeface="Times New Roman" panose="02020603050405020304" pitchFamily="18" charset="0"/>
-              </a:rPr>
-              <a:t> </a:t>
-            </a:r>
-            <a:r>
-              <a:rPr lang="fr-CA" sz="1800" dirty="0" err="1">
-                <a:solidFill>
-                  <a:srgbClr val="000000"/>
-                </a:solidFill>
-                <a:effectLst/>
-                <a:latin typeface="Open Sans" panose="020B0606030504020204" pitchFamily="34" charset="0"/>
-                <a:ea typeface="Times New Roman" panose="02020603050405020304" pitchFamily="18" charset="0"/>
-              </a:rPr>
-              <a:t>sit</a:t>
-            </a:r>
-            <a:r>
-              <a:rPr lang="fr-CA" sz="1800" dirty="0">
-                <a:solidFill>
-                  <a:srgbClr val="000000"/>
-                </a:solidFill>
-                <a:effectLst/>
-                <a:latin typeface="Open Sans" panose="020B0606030504020204" pitchFamily="34" charset="0"/>
-                <a:ea typeface="Times New Roman" panose="02020603050405020304" pitchFamily="18" charset="0"/>
-              </a:rPr>
-              <a:t> </a:t>
-            </a:r>
-            <a:r>
-              <a:rPr lang="fr-CA" sz="1800" dirty="0" err="1">
-                <a:solidFill>
-                  <a:srgbClr val="000000"/>
-                </a:solidFill>
-                <a:effectLst/>
-                <a:latin typeface="Open Sans" panose="020B0606030504020204" pitchFamily="34" charset="0"/>
-                <a:ea typeface="Times New Roman" panose="02020603050405020304" pitchFamily="18" charset="0"/>
-              </a:rPr>
-              <a:t>amet</a:t>
-            </a:r>
-            <a:r>
-              <a:rPr lang="fr-CA" sz="1800" dirty="0">
-                <a:solidFill>
-                  <a:srgbClr val="000000"/>
-                </a:solidFill>
-                <a:effectLst/>
-                <a:latin typeface="Open Sans" panose="020B0606030504020204" pitchFamily="34" charset="0"/>
-                <a:ea typeface="Times New Roman" panose="02020603050405020304" pitchFamily="18" charset="0"/>
-              </a:rPr>
-              <a:t>, dictum a </a:t>
-            </a:r>
-            <a:r>
-              <a:rPr lang="fr-CA" sz="1800" dirty="0" err="1">
-                <a:solidFill>
-                  <a:srgbClr val="000000"/>
-                </a:solidFill>
-                <a:effectLst/>
-                <a:latin typeface="Open Sans" panose="020B0606030504020204" pitchFamily="34" charset="0"/>
-                <a:ea typeface="Times New Roman" panose="02020603050405020304" pitchFamily="18" charset="0"/>
-              </a:rPr>
-              <a:t>mauris</a:t>
-            </a:r>
-            <a:r>
-              <a:rPr lang="fr-CA" sz="1800" dirty="0">
-                <a:solidFill>
-                  <a:srgbClr val="000000"/>
-                </a:solidFill>
-                <a:effectLst/>
-                <a:latin typeface="Open Sans" panose="020B0606030504020204" pitchFamily="34" charset="0"/>
-                <a:ea typeface="Times New Roman" panose="02020603050405020304" pitchFamily="18" charset="0"/>
-              </a:rPr>
-              <a:t>. Nam dictum </a:t>
-            </a:r>
-            <a:r>
-              <a:rPr lang="fr-CA" sz="1800" dirty="0" err="1">
-                <a:solidFill>
-                  <a:srgbClr val="000000"/>
-                </a:solidFill>
-                <a:effectLst/>
-                <a:latin typeface="Open Sans" panose="020B0606030504020204" pitchFamily="34" charset="0"/>
-                <a:ea typeface="Times New Roman" panose="02020603050405020304" pitchFamily="18" charset="0"/>
-              </a:rPr>
-              <a:t>posuere</a:t>
-            </a:r>
-            <a:r>
-              <a:rPr lang="fr-CA" sz="1800" dirty="0">
-                <a:solidFill>
-                  <a:srgbClr val="000000"/>
-                </a:solidFill>
-                <a:effectLst/>
-                <a:latin typeface="Open Sans" panose="020B0606030504020204" pitchFamily="34" charset="0"/>
-                <a:ea typeface="Times New Roman" panose="02020603050405020304" pitchFamily="18" charset="0"/>
-              </a:rPr>
-              <a:t> </a:t>
-            </a:r>
-            <a:r>
-              <a:rPr lang="fr-CA" sz="1800" dirty="0" err="1">
-                <a:solidFill>
-                  <a:srgbClr val="000000"/>
-                </a:solidFill>
-                <a:effectLst/>
-                <a:latin typeface="Open Sans" panose="020B0606030504020204" pitchFamily="34" charset="0"/>
-                <a:ea typeface="Times New Roman" panose="02020603050405020304" pitchFamily="18" charset="0"/>
-              </a:rPr>
-              <a:t>ultrices</a:t>
-            </a:r>
-            <a:r>
-              <a:rPr lang="fr-CA" sz="1800" dirty="0">
-                <a:solidFill>
-                  <a:srgbClr val="000000"/>
-                </a:solidFill>
-                <a:effectLst/>
-                <a:latin typeface="Open Sans" panose="020B0606030504020204" pitchFamily="34" charset="0"/>
-                <a:ea typeface="Times New Roman" panose="02020603050405020304" pitchFamily="18" charset="0"/>
-              </a:rPr>
-              <a:t>. </a:t>
-            </a:r>
-            <a:r>
-              <a:rPr lang="fr-CA" sz="1800" dirty="0" err="1">
-                <a:solidFill>
-                  <a:srgbClr val="000000"/>
-                </a:solidFill>
-                <a:effectLst/>
-                <a:latin typeface="Open Sans" panose="020B0606030504020204" pitchFamily="34" charset="0"/>
-                <a:ea typeface="Times New Roman" panose="02020603050405020304" pitchFamily="18" charset="0"/>
-              </a:rPr>
-              <a:t>Fusce</a:t>
-            </a:r>
-            <a:r>
-              <a:rPr lang="fr-CA" sz="1800" dirty="0">
-                <a:solidFill>
-                  <a:srgbClr val="000000"/>
-                </a:solidFill>
-                <a:effectLst/>
-                <a:latin typeface="Open Sans" panose="020B0606030504020204" pitchFamily="34" charset="0"/>
-                <a:ea typeface="Times New Roman" panose="02020603050405020304" pitchFamily="18" charset="0"/>
-              </a:rPr>
-              <a:t> a </a:t>
-            </a:r>
-            <a:r>
-              <a:rPr lang="fr-CA" sz="1800" dirty="0" err="1">
-                <a:solidFill>
-                  <a:srgbClr val="000000"/>
-                </a:solidFill>
-                <a:effectLst/>
-                <a:latin typeface="Open Sans" panose="020B0606030504020204" pitchFamily="34" charset="0"/>
-                <a:ea typeface="Times New Roman" panose="02020603050405020304" pitchFamily="18" charset="0"/>
-              </a:rPr>
-              <a:t>lacus</a:t>
-            </a:r>
-            <a:r>
-              <a:rPr lang="fr-CA" sz="1800" dirty="0">
-                <a:solidFill>
-                  <a:srgbClr val="000000"/>
-                </a:solidFill>
-                <a:effectLst/>
-                <a:latin typeface="Open Sans" panose="020B0606030504020204" pitchFamily="34" charset="0"/>
-                <a:ea typeface="Times New Roman" panose="02020603050405020304" pitchFamily="18" charset="0"/>
-              </a:rPr>
-              <a:t> </a:t>
-            </a:r>
-            <a:r>
-              <a:rPr lang="fr-CA" sz="1800" dirty="0" err="1">
-                <a:solidFill>
-                  <a:srgbClr val="000000"/>
-                </a:solidFill>
-                <a:effectLst/>
-                <a:latin typeface="Open Sans" panose="020B0606030504020204" pitchFamily="34" charset="0"/>
-                <a:ea typeface="Times New Roman" panose="02020603050405020304" pitchFamily="18" charset="0"/>
-              </a:rPr>
-              <a:t>vulputate</a:t>
-            </a:r>
-            <a:r>
-              <a:rPr lang="fr-CA" sz="1800" dirty="0">
-                <a:solidFill>
-                  <a:srgbClr val="000000"/>
-                </a:solidFill>
-                <a:effectLst/>
-                <a:latin typeface="Open Sans" panose="020B0606030504020204" pitchFamily="34" charset="0"/>
-                <a:ea typeface="Times New Roman" panose="02020603050405020304" pitchFamily="18" charset="0"/>
-              </a:rPr>
-              <a:t>, </a:t>
-            </a:r>
-            <a:r>
-              <a:rPr lang="fr-CA" sz="1800" dirty="0" err="1">
-                <a:solidFill>
-                  <a:srgbClr val="000000"/>
-                </a:solidFill>
-                <a:effectLst/>
-                <a:latin typeface="Open Sans" panose="020B0606030504020204" pitchFamily="34" charset="0"/>
-                <a:ea typeface="Times New Roman" panose="02020603050405020304" pitchFamily="18" charset="0"/>
-              </a:rPr>
-              <a:t>lobortis</a:t>
-            </a:r>
-            <a:r>
-              <a:rPr lang="fr-CA" sz="1800" dirty="0">
-                <a:solidFill>
-                  <a:srgbClr val="000000"/>
-                </a:solidFill>
-                <a:effectLst/>
-                <a:latin typeface="Open Sans" panose="020B0606030504020204" pitchFamily="34" charset="0"/>
-                <a:ea typeface="Times New Roman" panose="02020603050405020304" pitchFamily="18" charset="0"/>
-              </a:rPr>
-              <a:t> </a:t>
-            </a:r>
-            <a:r>
-              <a:rPr lang="fr-CA" sz="1800" dirty="0" err="1">
-                <a:solidFill>
-                  <a:srgbClr val="000000"/>
-                </a:solidFill>
-                <a:effectLst/>
-                <a:latin typeface="Open Sans" panose="020B0606030504020204" pitchFamily="34" charset="0"/>
-                <a:ea typeface="Times New Roman" panose="02020603050405020304" pitchFamily="18" charset="0"/>
-              </a:rPr>
-              <a:t>orci</a:t>
-            </a:r>
-            <a:r>
-              <a:rPr lang="fr-CA" sz="1800" dirty="0">
-                <a:solidFill>
-                  <a:srgbClr val="000000"/>
-                </a:solidFill>
-                <a:effectLst/>
-                <a:latin typeface="Open Sans" panose="020B0606030504020204" pitchFamily="34" charset="0"/>
-                <a:ea typeface="Times New Roman" panose="02020603050405020304" pitchFamily="18" charset="0"/>
-              </a:rPr>
-              <a:t> </a:t>
-            </a:r>
-            <a:r>
-              <a:rPr lang="fr-CA" sz="1800" dirty="0" err="1">
-                <a:solidFill>
-                  <a:srgbClr val="000000"/>
-                </a:solidFill>
-                <a:effectLst/>
-                <a:latin typeface="Open Sans" panose="020B0606030504020204" pitchFamily="34" charset="0"/>
-                <a:ea typeface="Times New Roman" panose="02020603050405020304" pitchFamily="18" charset="0"/>
-              </a:rPr>
-              <a:t>quis</a:t>
-            </a:r>
-            <a:r>
-              <a:rPr lang="fr-CA" sz="1800" dirty="0">
-                <a:solidFill>
-                  <a:srgbClr val="000000"/>
-                </a:solidFill>
-                <a:effectLst/>
-                <a:latin typeface="Open Sans" panose="020B0606030504020204" pitchFamily="34" charset="0"/>
-                <a:ea typeface="Times New Roman" panose="02020603050405020304" pitchFamily="18" charset="0"/>
-              </a:rPr>
-              <a:t>, </a:t>
-            </a:r>
-            <a:r>
-              <a:rPr lang="fr-CA" sz="1800" dirty="0" err="1">
-                <a:solidFill>
-                  <a:srgbClr val="000000"/>
-                </a:solidFill>
-                <a:effectLst/>
-                <a:latin typeface="Open Sans" panose="020B0606030504020204" pitchFamily="34" charset="0"/>
-                <a:ea typeface="Times New Roman" panose="02020603050405020304" pitchFamily="18" charset="0"/>
-              </a:rPr>
-              <a:t>blandit</a:t>
-            </a:r>
-            <a:r>
-              <a:rPr lang="fr-CA" sz="1800" dirty="0">
-                <a:solidFill>
-                  <a:srgbClr val="000000"/>
-                </a:solidFill>
-                <a:effectLst/>
-                <a:latin typeface="Open Sans" panose="020B0606030504020204" pitchFamily="34" charset="0"/>
-                <a:ea typeface="Times New Roman" panose="02020603050405020304" pitchFamily="18" charset="0"/>
-              </a:rPr>
-              <a:t> </a:t>
-            </a:r>
-            <a:r>
-              <a:rPr lang="fr-CA" sz="1800" dirty="0" err="1">
-                <a:solidFill>
-                  <a:srgbClr val="000000"/>
-                </a:solidFill>
-                <a:effectLst/>
-                <a:latin typeface="Open Sans" panose="020B0606030504020204" pitchFamily="34" charset="0"/>
-                <a:ea typeface="Times New Roman" panose="02020603050405020304" pitchFamily="18" charset="0"/>
-              </a:rPr>
-              <a:t>nisl</a:t>
-            </a:r>
-            <a:r>
-              <a:rPr lang="fr-CA" sz="1800" dirty="0">
-                <a:solidFill>
-                  <a:srgbClr val="000000"/>
-                </a:solidFill>
-                <a:effectLst/>
-                <a:latin typeface="Open Sans" panose="020B0606030504020204" pitchFamily="34" charset="0"/>
-                <a:ea typeface="Times New Roman" panose="02020603050405020304" pitchFamily="18" charset="0"/>
-              </a:rPr>
-              <a:t>. Duis </a:t>
-            </a:r>
-            <a:r>
-              <a:rPr lang="fr-CA" sz="1800" dirty="0" err="1">
-                <a:solidFill>
-                  <a:srgbClr val="000000"/>
-                </a:solidFill>
-                <a:effectLst/>
-                <a:latin typeface="Open Sans" panose="020B0606030504020204" pitchFamily="34" charset="0"/>
-                <a:ea typeface="Times New Roman" panose="02020603050405020304" pitchFamily="18" charset="0"/>
-              </a:rPr>
-              <a:t>euismod</a:t>
-            </a:r>
-            <a:r>
-              <a:rPr lang="fr-CA" sz="1800" dirty="0">
-                <a:solidFill>
-                  <a:srgbClr val="000000"/>
-                </a:solidFill>
-                <a:effectLst/>
-                <a:latin typeface="Open Sans" panose="020B0606030504020204" pitchFamily="34" charset="0"/>
-                <a:ea typeface="Times New Roman" panose="02020603050405020304" pitchFamily="18" charset="0"/>
-              </a:rPr>
-              <a:t> </a:t>
-            </a:r>
-            <a:r>
-              <a:rPr lang="fr-CA" sz="1800" dirty="0" err="1">
-                <a:solidFill>
-                  <a:srgbClr val="000000"/>
-                </a:solidFill>
-                <a:effectLst/>
-                <a:latin typeface="Open Sans" panose="020B0606030504020204" pitchFamily="34" charset="0"/>
-                <a:ea typeface="Times New Roman" panose="02020603050405020304" pitchFamily="18" charset="0"/>
-              </a:rPr>
-              <a:t>maximus</a:t>
-            </a:r>
-            <a:r>
-              <a:rPr lang="fr-CA" sz="1800" dirty="0">
-                <a:solidFill>
-                  <a:srgbClr val="000000"/>
-                </a:solidFill>
-                <a:effectLst/>
-                <a:latin typeface="Open Sans" panose="020B0606030504020204" pitchFamily="34" charset="0"/>
-                <a:ea typeface="Times New Roman" panose="02020603050405020304" pitchFamily="18" charset="0"/>
-              </a:rPr>
-              <a:t> </a:t>
-            </a:r>
-            <a:r>
-              <a:rPr lang="fr-CA" sz="1800" dirty="0" err="1">
-                <a:solidFill>
-                  <a:srgbClr val="000000"/>
-                </a:solidFill>
-                <a:effectLst/>
-                <a:latin typeface="Open Sans" panose="020B0606030504020204" pitchFamily="34" charset="0"/>
-                <a:ea typeface="Times New Roman" panose="02020603050405020304" pitchFamily="18" charset="0"/>
-              </a:rPr>
-              <a:t>euismod</a:t>
-            </a:r>
-            <a:r>
-              <a:rPr lang="fr-CA" sz="1800" dirty="0">
-                <a:solidFill>
-                  <a:srgbClr val="000000"/>
-                </a:solidFill>
-                <a:effectLst/>
-                <a:latin typeface="Open Sans" panose="020B0606030504020204" pitchFamily="34" charset="0"/>
-                <a:ea typeface="Times New Roman" panose="02020603050405020304" pitchFamily="18" charset="0"/>
-              </a:rPr>
-              <a:t>. </a:t>
-            </a:r>
-            <a:r>
-              <a:rPr lang="fr-CA" sz="1800" dirty="0" err="1">
-                <a:solidFill>
-                  <a:srgbClr val="000000"/>
-                </a:solidFill>
-                <a:effectLst/>
-                <a:latin typeface="Open Sans" panose="020B0606030504020204" pitchFamily="34" charset="0"/>
-                <a:ea typeface="Times New Roman" panose="02020603050405020304" pitchFamily="18" charset="0"/>
-              </a:rPr>
-              <a:t>Fusce</a:t>
-            </a:r>
-            <a:r>
-              <a:rPr lang="fr-CA" sz="1800" dirty="0">
-                <a:solidFill>
-                  <a:srgbClr val="000000"/>
-                </a:solidFill>
-                <a:effectLst/>
-                <a:latin typeface="Open Sans" panose="020B0606030504020204" pitchFamily="34" charset="0"/>
-                <a:ea typeface="Times New Roman" panose="02020603050405020304" pitchFamily="18" charset="0"/>
-              </a:rPr>
-              <a:t> </a:t>
-            </a:r>
-            <a:r>
-              <a:rPr lang="fr-CA" sz="1800" dirty="0" err="1">
-                <a:solidFill>
-                  <a:srgbClr val="000000"/>
-                </a:solidFill>
-                <a:effectLst/>
-                <a:latin typeface="Open Sans" panose="020B0606030504020204" pitchFamily="34" charset="0"/>
-                <a:ea typeface="Times New Roman" panose="02020603050405020304" pitchFamily="18" charset="0"/>
-              </a:rPr>
-              <a:t>condimentum</a:t>
-            </a:r>
-            <a:r>
-              <a:rPr lang="fr-CA" sz="1800" dirty="0">
-                <a:solidFill>
-                  <a:srgbClr val="000000"/>
-                </a:solidFill>
-                <a:effectLst/>
-                <a:latin typeface="Open Sans" panose="020B0606030504020204" pitchFamily="34" charset="0"/>
-                <a:ea typeface="Times New Roman" panose="02020603050405020304" pitchFamily="18" charset="0"/>
-              </a:rPr>
-              <a:t> </a:t>
-            </a:r>
-            <a:r>
-              <a:rPr lang="fr-CA" sz="1800" dirty="0" err="1">
-                <a:solidFill>
-                  <a:srgbClr val="000000"/>
-                </a:solidFill>
-                <a:effectLst/>
-                <a:latin typeface="Open Sans" panose="020B0606030504020204" pitchFamily="34" charset="0"/>
-                <a:ea typeface="Times New Roman" panose="02020603050405020304" pitchFamily="18" charset="0"/>
-              </a:rPr>
-              <a:t>quis</a:t>
-            </a:r>
-            <a:r>
-              <a:rPr lang="fr-CA" sz="1800" dirty="0">
-                <a:solidFill>
-                  <a:srgbClr val="000000"/>
-                </a:solidFill>
-                <a:effectLst/>
-                <a:latin typeface="Open Sans" panose="020B0606030504020204" pitchFamily="34" charset="0"/>
-                <a:ea typeface="Times New Roman" panose="02020603050405020304" pitchFamily="18" charset="0"/>
-              </a:rPr>
-              <a:t> </a:t>
-            </a:r>
-            <a:r>
-              <a:rPr lang="fr-CA" sz="1800" dirty="0" err="1">
-                <a:solidFill>
-                  <a:srgbClr val="000000"/>
-                </a:solidFill>
-                <a:effectLst/>
-                <a:latin typeface="Open Sans" panose="020B0606030504020204" pitchFamily="34" charset="0"/>
-                <a:ea typeface="Times New Roman" panose="02020603050405020304" pitchFamily="18" charset="0"/>
-              </a:rPr>
-              <a:t>arcu</a:t>
-            </a:r>
-            <a:r>
-              <a:rPr lang="fr-CA" sz="1800" dirty="0">
-                <a:solidFill>
-                  <a:srgbClr val="000000"/>
-                </a:solidFill>
-                <a:effectLst/>
-                <a:latin typeface="Open Sans" panose="020B0606030504020204" pitchFamily="34" charset="0"/>
-                <a:ea typeface="Times New Roman" panose="02020603050405020304" pitchFamily="18" charset="0"/>
-              </a:rPr>
-              <a:t> nec </a:t>
-            </a:r>
-            <a:r>
-              <a:rPr lang="fr-CA" sz="1800" dirty="0" err="1">
-                <a:solidFill>
-                  <a:srgbClr val="000000"/>
-                </a:solidFill>
-                <a:effectLst/>
-                <a:latin typeface="Open Sans" panose="020B0606030504020204" pitchFamily="34" charset="0"/>
-                <a:ea typeface="Times New Roman" panose="02020603050405020304" pitchFamily="18" charset="0"/>
-              </a:rPr>
-              <a:t>maximus</a:t>
-            </a:r>
-            <a:r>
-              <a:rPr lang="fr-CA" sz="1800" dirty="0">
-                <a:solidFill>
-                  <a:srgbClr val="000000"/>
-                </a:solidFill>
-                <a:effectLst/>
-                <a:latin typeface="Open Sans" panose="020B0606030504020204" pitchFamily="34" charset="0"/>
-                <a:ea typeface="Times New Roman" panose="02020603050405020304" pitchFamily="18" charset="0"/>
-              </a:rPr>
-              <a:t>. </a:t>
-            </a:r>
-            <a:r>
-              <a:rPr lang="fr-CA" sz="1800" dirty="0" err="1">
-                <a:solidFill>
-                  <a:srgbClr val="000000"/>
-                </a:solidFill>
-                <a:effectLst/>
-                <a:latin typeface="Open Sans" panose="020B0606030504020204" pitchFamily="34" charset="0"/>
-                <a:ea typeface="Times New Roman" panose="02020603050405020304" pitchFamily="18" charset="0"/>
-              </a:rPr>
-              <a:t>Vestibulum</a:t>
-            </a:r>
-            <a:r>
-              <a:rPr lang="fr-CA" sz="1800" dirty="0">
-                <a:solidFill>
-                  <a:srgbClr val="000000"/>
-                </a:solidFill>
-                <a:effectLst/>
-                <a:latin typeface="Open Sans" panose="020B0606030504020204" pitchFamily="34" charset="0"/>
-                <a:ea typeface="Times New Roman" panose="02020603050405020304" pitchFamily="18" charset="0"/>
-              </a:rPr>
-              <a:t> </a:t>
-            </a:r>
-            <a:r>
-              <a:rPr lang="fr-CA" sz="1800" dirty="0" err="1">
-                <a:solidFill>
-                  <a:srgbClr val="000000"/>
-                </a:solidFill>
-                <a:effectLst/>
-                <a:latin typeface="Open Sans" panose="020B0606030504020204" pitchFamily="34" charset="0"/>
-                <a:ea typeface="Times New Roman" panose="02020603050405020304" pitchFamily="18" charset="0"/>
-              </a:rPr>
-              <a:t>lobortis</a:t>
-            </a:r>
-            <a:r>
-              <a:rPr lang="fr-CA" sz="1800" dirty="0">
-                <a:solidFill>
-                  <a:srgbClr val="000000"/>
-                </a:solidFill>
-                <a:effectLst/>
-                <a:latin typeface="Open Sans" panose="020B0606030504020204" pitchFamily="34" charset="0"/>
-                <a:ea typeface="Times New Roman" panose="02020603050405020304" pitchFamily="18" charset="0"/>
-              </a:rPr>
-              <a:t> </a:t>
-            </a:r>
-            <a:r>
-              <a:rPr lang="fr-CA" sz="1800" dirty="0" err="1">
-                <a:solidFill>
-                  <a:srgbClr val="000000"/>
-                </a:solidFill>
-                <a:effectLst/>
-                <a:latin typeface="Open Sans" panose="020B0606030504020204" pitchFamily="34" charset="0"/>
-                <a:ea typeface="Times New Roman" panose="02020603050405020304" pitchFamily="18" charset="0"/>
-              </a:rPr>
-              <a:t>porttitor</a:t>
-            </a:r>
-            <a:r>
-              <a:rPr lang="fr-CA" sz="1800" dirty="0">
-                <a:solidFill>
-                  <a:srgbClr val="000000"/>
-                </a:solidFill>
-                <a:effectLst/>
-                <a:latin typeface="Open Sans" panose="020B0606030504020204" pitchFamily="34" charset="0"/>
-                <a:ea typeface="Times New Roman" panose="02020603050405020304" pitchFamily="18" charset="0"/>
-              </a:rPr>
-              <a:t> </a:t>
-            </a:r>
-            <a:r>
-              <a:rPr lang="fr-CA" sz="1800" dirty="0" err="1">
-                <a:solidFill>
-                  <a:srgbClr val="000000"/>
-                </a:solidFill>
-                <a:effectLst/>
-                <a:latin typeface="Open Sans" panose="020B0606030504020204" pitchFamily="34" charset="0"/>
-                <a:ea typeface="Times New Roman" panose="02020603050405020304" pitchFamily="18" charset="0"/>
-              </a:rPr>
-              <a:t>arcu</a:t>
-            </a:r>
-            <a:r>
-              <a:rPr lang="fr-CA" sz="1800" dirty="0">
-                <a:solidFill>
-                  <a:srgbClr val="000000"/>
-                </a:solidFill>
-                <a:effectLst/>
-                <a:latin typeface="Open Sans" panose="020B0606030504020204" pitchFamily="34" charset="0"/>
-                <a:ea typeface="Times New Roman" panose="02020603050405020304" pitchFamily="18" charset="0"/>
-              </a:rPr>
-              <a:t> et </a:t>
-            </a:r>
-            <a:r>
-              <a:rPr lang="fr-CA" sz="1800" dirty="0" err="1">
-                <a:solidFill>
-                  <a:srgbClr val="000000"/>
-                </a:solidFill>
-                <a:effectLst/>
-                <a:latin typeface="Open Sans" panose="020B0606030504020204" pitchFamily="34" charset="0"/>
-                <a:ea typeface="Times New Roman" panose="02020603050405020304" pitchFamily="18" charset="0"/>
-              </a:rPr>
-              <a:t>congue</a:t>
-            </a:r>
-            <a:r>
-              <a:rPr lang="fr-CA" sz="1800" dirty="0">
-                <a:solidFill>
-                  <a:srgbClr val="000000"/>
-                </a:solidFill>
-                <a:effectLst/>
-                <a:latin typeface="Open Sans" panose="020B0606030504020204" pitchFamily="34" charset="0"/>
-                <a:ea typeface="Times New Roman" panose="02020603050405020304" pitchFamily="18" charset="0"/>
-              </a:rPr>
-              <a:t>.</a:t>
-            </a:r>
-            <a:endParaRPr lang="en-CA" sz="1800" dirty="0">
-              <a:effectLst/>
-              <a:latin typeface="Times New Roman" panose="02020603050405020304" pitchFamily="18" charset="0"/>
-              <a:ea typeface="Times New Roman" panose="02020603050405020304" pitchFamily="18" charset="0"/>
-            </a:endParaRPr>
-          </a:p>
-          <a:p>
-            <a:pPr marL="0" marR="0" algn="just">
-              <a:spcBef>
-                <a:spcPts val="0"/>
-              </a:spcBef>
-              <a:spcAft>
-                <a:spcPts val="1125"/>
-              </a:spcAft>
-            </a:pPr>
-            <a:r>
-              <a:rPr lang="fr-CA" sz="1800" dirty="0" err="1">
-                <a:solidFill>
-                  <a:srgbClr val="000000"/>
-                </a:solidFill>
-                <a:effectLst/>
-                <a:latin typeface="Open Sans" panose="020B0606030504020204" pitchFamily="34" charset="0"/>
-                <a:ea typeface="Times New Roman" panose="02020603050405020304" pitchFamily="18" charset="0"/>
-              </a:rPr>
-              <a:t>Quisque</a:t>
-            </a:r>
-            <a:r>
-              <a:rPr lang="fr-CA" sz="1800" dirty="0">
-                <a:solidFill>
-                  <a:srgbClr val="000000"/>
-                </a:solidFill>
-                <a:effectLst/>
-                <a:latin typeface="Open Sans" panose="020B0606030504020204" pitchFamily="34" charset="0"/>
-                <a:ea typeface="Times New Roman" panose="02020603050405020304" pitchFamily="18" charset="0"/>
-              </a:rPr>
-              <a:t> </a:t>
-            </a:r>
-            <a:r>
-              <a:rPr lang="fr-CA" sz="1800" dirty="0" err="1">
-                <a:solidFill>
-                  <a:srgbClr val="000000"/>
-                </a:solidFill>
-                <a:effectLst/>
-                <a:latin typeface="Open Sans" panose="020B0606030504020204" pitchFamily="34" charset="0"/>
-                <a:ea typeface="Times New Roman" panose="02020603050405020304" pitchFamily="18" charset="0"/>
-              </a:rPr>
-              <a:t>aliquet</a:t>
-            </a:r>
-            <a:r>
-              <a:rPr lang="fr-CA" sz="1800" dirty="0">
-                <a:solidFill>
-                  <a:srgbClr val="000000"/>
-                </a:solidFill>
-                <a:effectLst/>
-                <a:latin typeface="Open Sans" panose="020B0606030504020204" pitchFamily="34" charset="0"/>
-                <a:ea typeface="Times New Roman" panose="02020603050405020304" pitchFamily="18" charset="0"/>
-              </a:rPr>
-              <a:t> </a:t>
-            </a:r>
-            <a:r>
-              <a:rPr lang="fr-CA" sz="1800" dirty="0" err="1">
-                <a:solidFill>
-                  <a:srgbClr val="000000"/>
-                </a:solidFill>
-                <a:effectLst/>
-                <a:latin typeface="Open Sans" panose="020B0606030504020204" pitchFamily="34" charset="0"/>
-                <a:ea typeface="Times New Roman" panose="02020603050405020304" pitchFamily="18" charset="0"/>
-              </a:rPr>
-              <a:t>laoreet</a:t>
-            </a:r>
-            <a:r>
-              <a:rPr lang="fr-CA" sz="1800" dirty="0">
-                <a:solidFill>
-                  <a:srgbClr val="000000"/>
-                </a:solidFill>
-                <a:effectLst/>
-                <a:latin typeface="Open Sans" panose="020B0606030504020204" pitchFamily="34" charset="0"/>
-                <a:ea typeface="Times New Roman" panose="02020603050405020304" pitchFamily="18" charset="0"/>
-              </a:rPr>
-              <a:t> </a:t>
-            </a:r>
-            <a:r>
-              <a:rPr lang="fr-CA" sz="1800" dirty="0" err="1">
-                <a:solidFill>
-                  <a:srgbClr val="000000"/>
-                </a:solidFill>
-                <a:effectLst/>
-                <a:latin typeface="Open Sans" panose="020B0606030504020204" pitchFamily="34" charset="0"/>
-                <a:ea typeface="Times New Roman" panose="02020603050405020304" pitchFamily="18" charset="0"/>
-              </a:rPr>
-              <a:t>enim</a:t>
-            </a:r>
-            <a:r>
-              <a:rPr lang="fr-CA" sz="1800" dirty="0">
-                <a:solidFill>
-                  <a:srgbClr val="000000"/>
-                </a:solidFill>
-                <a:effectLst/>
-                <a:latin typeface="Open Sans" panose="020B0606030504020204" pitchFamily="34" charset="0"/>
-                <a:ea typeface="Times New Roman" panose="02020603050405020304" pitchFamily="18" charset="0"/>
-              </a:rPr>
-              <a:t> </a:t>
-            </a:r>
-            <a:r>
-              <a:rPr lang="fr-CA" sz="1800" dirty="0" err="1">
-                <a:solidFill>
-                  <a:srgbClr val="000000"/>
-                </a:solidFill>
-                <a:effectLst/>
-                <a:latin typeface="Open Sans" panose="020B0606030504020204" pitchFamily="34" charset="0"/>
-                <a:ea typeface="Times New Roman" panose="02020603050405020304" pitchFamily="18" charset="0"/>
-              </a:rPr>
-              <a:t>sed</a:t>
-            </a:r>
-            <a:r>
-              <a:rPr lang="fr-CA" sz="1800" dirty="0">
-                <a:solidFill>
-                  <a:srgbClr val="000000"/>
-                </a:solidFill>
-                <a:effectLst/>
-                <a:latin typeface="Open Sans" panose="020B0606030504020204" pitchFamily="34" charset="0"/>
-                <a:ea typeface="Times New Roman" panose="02020603050405020304" pitchFamily="18" charset="0"/>
-              </a:rPr>
-              <a:t> </a:t>
-            </a:r>
-            <a:r>
-              <a:rPr lang="fr-CA" sz="1800" dirty="0" err="1">
-                <a:solidFill>
-                  <a:srgbClr val="000000"/>
-                </a:solidFill>
-                <a:effectLst/>
-                <a:latin typeface="Open Sans" panose="020B0606030504020204" pitchFamily="34" charset="0"/>
-                <a:ea typeface="Times New Roman" panose="02020603050405020304" pitchFamily="18" charset="0"/>
-              </a:rPr>
-              <a:t>venenatis</a:t>
-            </a:r>
-            <a:r>
-              <a:rPr lang="fr-CA" sz="1800" dirty="0">
-                <a:solidFill>
-                  <a:srgbClr val="000000"/>
-                </a:solidFill>
-                <a:effectLst/>
-                <a:latin typeface="Open Sans" panose="020B0606030504020204" pitchFamily="34" charset="0"/>
-                <a:ea typeface="Times New Roman" panose="02020603050405020304" pitchFamily="18" charset="0"/>
-              </a:rPr>
-              <a:t>. </a:t>
-            </a:r>
-            <a:r>
-              <a:rPr lang="fr-CA" sz="1800" dirty="0" err="1">
-                <a:solidFill>
-                  <a:srgbClr val="000000"/>
-                </a:solidFill>
-                <a:effectLst/>
-                <a:latin typeface="Open Sans" panose="020B0606030504020204" pitchFamily="34" charset="0"/>
-                <a:ea typeface="Times New Roman" panose="02020603050405020304" pitchFamily="18" charset="0"/>
-              </a:rPr>
-              <a:t>Praesent</a:t>
-            </a:r>
-            <a:r>
-              <a:rPr lang="fr-CA" sz="1800" dirty="0">
-                <a:solidFill>
-                  <a:srgbClr val="000000"/>
-                </a:solidFill>
-                <a:effectLst/>
-                <a:latin typeface="Open Sans" panose="020B0606030504020204" pitchFamily="34" charset="0"/>
-                <a:ea typeface="Times New Roman" panose="02020603050405020304" pitchFamily="18" charset="0"/>
-              </a:rPr>
-              <a:t> </a:t>
-            </a:r>
-            <a:r>
-              <a:rPr lang="fr-CA" sz="1800" dirty="0" err="1">
-                <a:solidFill>
-                  <a:srgbClr val="000000"/>
-                </a:solidFill>
-                <a:effectLst/>
-                <a:latin typeface="Open Sans" panose="020B0606030504020204" pitchFamily="34" charset="0"/>
-                <a:ea typeface="Times New Roman" panose="02020603050405020304" pitchFamily="18" charset="0"/>
-              </a:rPr>
-              <a:t>quis</a:t>
-            </a:r>
-            <a:r>
-              <a:rPr lang="fr-CA" sz="1800" dirty="0">
-                <a:solidFill>
-                  <a:srgbClr val="000000"/>
-                </a:solidFill>
-                <a:effectLst/>
-                <a:latin typeface="Open Sans" panose="020B0606030504020204" pitchFamily="34" charset="0"/>
-                <a:ea typeface="Times New Roman" panose="02020603050405020304" pitchFamily="18" charset="0"/>
-              </a:rPr>
-              <a:t> ipsum in </a:t>
-            </a:r>
-            <a:r>
-              <a:rPr lang="fr-CA" sz="1800" dirty="0" err="1">
-                <a:solidFill>
-                  <a:srgbClr val="000000"/>
-                </a:solidFill>
-                <a:effectLst/>
-                <a:latin typeface="Open Sans" panose="020B0606030504020204" pitchFamily="34" charset="0"/>
-                <a:ea typeface="Times New Roman" panose="02020603050405020304" pitchFamily="18" charset="0"/>
-              </a:rPr>
-              <a:t>dui</a:t>
-            </a:r>
-            <a:r>
-              <a:rPr lang="fr-CA" sz="1800" dirty="0">
-                <a:solidFill>
-                  <a:srgbClr val="000000"/>
-                </a:solidFill>
-                <a:effectLst/>
-                <a:latin typeface="Open Sans" panose="020B0606030504020204" pitchFamily="34" charset="0"/>
-                <a:ea typeface="Times New Roman" panose="02020603050405020304" pitchFamily="18" charset="0"/>
-              </a:rPr>
-              <a:t> dictum </a:t>
-            </a:r>
-            <a:r>
-              <a:rPr lang="fr-CA" sz="1800" dirty="0" err="1">
-                <a:solidFill>
-                  <a:srgbClr val="000000"/>
-                </a:solidFill>
-                <a:effectLst/>
-                <a:latin typeface="Open Sans" panose="020B0606030504020204" pitchFamily="34" charset="0"/>
-                <a:ea typeface="Times New Roman" panose="02020603050405020304" pitchFamily="18" charset="0"/>
-              </a:rPr>
-              <a:t>fermentum</a:t>
-            </a:r>
-            <a:r>
-              <a:rPr lang="fr-CA" sz="1800" dirty="0">
-                <a:solidFill>
-                  <a:srgbClr val="000000"/>
-                </a:solidFill>
-                <a:effectLst/>
-                <a:latin typeface="Open Sans" panose="020B0606030504020204" pitchFamily="34" charset="0"/>
-                <a:ea typeface="Times New Roman" panose="02020603050405020304" pitchFamily="18" charset="0"/>
-              </a:rPr>
-              <a:t>. </a:t>
-            </a:r>
-            <a:r>
-              <a:rPr lang="fr-CA" sz="1800" dirty="0" err="1">
-                <a:solidFill>
-                  <a:srgbClr val="000000"/>
-                </a:solidFill>
-                <a:effectLst/>
-                <a:latin typeface="Open Sans" panose="020B0606030504020204" pitchFamily="34" charset="0"/>
-                <a:ea typeface="Times New Roman" panose="02020603050405020304" pitchFamily="18" charset="0"/>
-              </a:rPr>
-              <a:t>Vestibulum</a:t>
-            </a:r>
-            <a:r>
-              <a:rPr lang="fr-CA" sz="1800" dirty="0">
-                <a:solidFill>
-                  <a:srgbClr val="000000"/>
-                </a:solidFill>
-                <a:effectLst/>
-                <a:latin typeface="Open Sans" panose="020B0606030504020204" pitchFamily="34" charset="0"/>
-                <a:ea typeface="Times New Roman" panose="02020603050405020304" pitchFamily="18" charset="0"/>
-              </a:rPr>
-              <a:t> ante ipsum </a:t>
-            </a:r>
-            <a:r>
-              <a:rPr lang="fr-CA" sz="1800" dirty="0" err="1">
-                <a:solidFill>
-                  <a:srgbClr val="000000"/>
-                </a:solidFill>
-                <a:effectLst/>
-                <a:latin typeface="Open Sans" panose="020B0606030504020204" pitchFamily="34" charset="0"/>
-                <a:ea typeface="Times New Roman" panose="02020603050405020304" pitchFamily="18" charset="0"/>
-              </a:rPr>
-              <a:t>primis</a:t>
-            </a:r>
-            <a:r>
-              <a:rPr lang="fr-CA" sz="1800" dirty="0">
-                <a:solidFill>
-                  <a:srgbClr val="000000"/>
-                </a:solidFill>
-                <a:effectLst/>
-                <a:latin typeface="Open Sans" panose="020B0606030504020204" pitchFamily="34" charset="0"/>
-                <a:ea typeface="Times New Roman" panose="02020603050405020304" pitchFamily="18" charset="0"/>
-              </a:rPr>
-              <a:t> in </a:t>
-            </a:r>
-            <a:r>
-              <a:rPr lang="fr-CA" sz="1800" dirty="0" err="1">
-                <a:solidFill>
-                  <a:srgbClr val="000000"/>
-                </a:solidFill>
-                <a:effectLst/>
-                <a:latin typeface="Open Sans" panose="020B0606030504020204" pitchFamily="34" charset="0"/>
-                <a:ea typeface="Times New Roman" panose="02020603050405020304" pitchFamily="18" charset="0"/>
-              </a:rPr>
-              <a:t>faucibus</a:t>
-            </a:r>
-            <a:r>
-              <a:rPr lang="fr-CA" sz="1800" dirty="0">
-                <a:solidFill>
-                  <a:srgbClr val="000000"/>
-                </a:solidFill>
-                <a:effectLst/>
-                <a:latin typeface="Open Sans" panose="020B0606030504020204" pitchFamily="34" charset="0"/>
-                <a:ea typeface="Times New Roman" panose="02020603050405020304" pitchFamily="18" charset="0"/>
-              </a:rPr>
-              <a:t> </a:t>
-            </a:r>
-            <a:r>
-              <a:rPr lang="fr-CA" sz="1800" dirty="0" err="1">
-                <a:solidFill>
-                  <a:srgbClr val="000000"/>
-                </a:solidFill>
-                <a:effectLst/>
-                <a:latin typeface="Open Sans" panose="020B0606030504020204" pitchFamily="34" charset="0"/>
-                <a:ea typeface="Times New Roman" panose="02020603050405020304" pitchFamily="18" charset="0"/>
-              </a:rPr>
-              <a:t>orci</a:t>
-            </a:r>
-            <a:r>
-              <a:rPr lang="fr-CA" sz="1800" dirty="0">
-                <a:solidFill>
-                  <a:srgbClr val="000000"/>
-                </a:solidFill>
-                <a:effectLst/>
-                <a:latin typeface="Open Sans" panose="020B0606030504020204" pitchFamily="34" charset="0"/>
-                <a:ea typeface="Times New Roman" panose="02020603050405020304" pitchFamily="18" charset="0"/>
-              </a:rPr>
-              <a:t> </a:t>
-            </a:r>
-            <a:r>
-              <a:rPr lang="fr-CA" sz="1800" dirty="0" err="1">
-                <a:solidFill>
-                  <a:srgbClr val="000000"/>
-                </a:solidFill>
-                <a:effectLst/>
-                <a:latin typeface="Open Sans" panose="020B0606030504020204" pitchFamily="34" charset="0"/>
-                <a:ea typeface="Times New Roman" panose="02020603050405020304" pitchFamily="18" charset="0"/>
-              </a:rPr>
-              <a:t>luctus</a:t>
-            </a:r>
-            <a:r>
-              <a:rPr lang="fr-CA" sz="1800" dirty="0">
-                <a:solidFill>
-                  <a:srgbClr val="000000"/>
-                </a:solidFill>
-                <a:effectLst/>
-                <a:latin typeface="Open Sans" panose="020B0606030504020204" pitchFamily="34" charset="0"/>
-                <a:ea typeface="Times New Roman" panose="02020603050405020304" pitchFamily="18" charset="0"/>
-              </a:rPr>
-              <a:t> et </a:t>
-            </a:r>
-            <a:r>
-              <a:rPr lang="fr-CA" sz="1800" dirty="0" err="1">
-                <a:solidFill>
-                  <a:srgbClr val="000000"/>
-                </a:solidFill>
-                <a:effectLst/>
-                <a:latin typeface="Open Sans" panose="020B0606030504020204" pitchFamily="34" charset="0"/>
-                <a:ea typeface="Times New Roman" panose="02020603050405020304" pitchFamily="18" charset="0"/>
-              </a:rPr>
-              <a:t>ultrices</a:t>
-            </a:r>
-            <a:r>
-              <a:rPr lang="fr-CA" sz="1800" dirty="0">
-                <a:solidFill>
-                  <a:srgbClr val="000000"/>
-                </a:solidFill>
-                <a:effectLst/>
-                <a:latin typeface="Open Sans" panose="020B0606030504020204" pitchFamily="34" charset="0"/>
-                <a:ea typeface="Times New Roman" panose="02020603050405020304" pitchFamily="18" charset="0"/>
-              </a:rPr>
-              <a:t> </a:t>
-            </a:r>
-            <a:r>
-              <a:rPr lang="fr-CA" sz="1800" dirty="0" err="1">
-                <a:solidFill>
-                  <a:srgbClr val="000000"/>
-                </a:solidFill>
-                <a:effectLst/>
-                <a:latin typeface="Open Sans" panose="020B0606030504020204" pitchFamily="34" charset="0"/>
-                <a:ea typeface="Times New Roman" panose="02020603050405020304" pitchFamily="18" charset="0"/>
-              </a:rPr>
-              <a:t>posuere</a:t>
-            </a:r>
-            <a:r>
-              <a:rPr lang="fr-CA" sz="1800" dirty="0">
-                <a:solidFill>
-                  <a:srgbClr val="000000"/>
-                </a:solidFill>
-                <a:effectLst/>
-                <a:latin typeface="Open Sans" panose="020B0606030504020204" pitchFamily="34" charset="0"/>
-                <a:ea typeface="Times New Roman" panose="02020603050405020304" pitchFamily="18" charset="0"/>
-              </a:rPr>
-              <a:t> </a:t>
-            </a:r>
-            <a:r>
-              <a:rPr lang="fr-CA" sz="1800" dirty="0" err="1">
-                <a:solidFill>
-                  <a:srgbClr val="000000"/>
-                </a:solidFill>
-                <a:effectLst/>
-                <a:latin typeface="Open Sans" panose="020B0606030504020204" pitchFamily="34" charset="0"/>
-                <a:ea typeface="Times New Roman" panose="02020603050405020304" pitchFamily="18" charset="0"/>
-              </a:rPr>
-              <a:t>cubilia</a:t>
-            </a:r>
-            <a:r>
-              <a:rPr lang="fr-CA" sz="1800" dirty="0">
-                <a:solidFill>
-                  <a:srgbClr val="000000"/>
-                </a:solidFill>
-                <a:effectLst/>
-                <a:latin typeface="Open Sans" panose="020B0606030504020204" pitchFamily="34" charset="0"/>
-                <a:ea typeface="Times New Roman" panose="02020603050405020304" pitchFamily="18" charset="0"/>
-              </a:rPr>
-              <a:t> </a:t>
-            </a:r>
-            <a:r>
-              <a:rPr lang="fr-CA" sz="1800" dirty="0" err="1">
-                <a:solidFill>
-                  <a:srgbClr val="000000"/>
-                </a:solidFill>
-                <a:effectLst/>
-                <a:latin typeface="Open Sans" panose="020B0606030504020204" pitchFamily="34" charset="0"/>
-                <a:ea typeface="Times New Roman" panose="02020603050405020304" pitchFamily="18" charset="0"/>
-              </a:rPr>
-              <a:t>curae</a:t>
-            </a:r>
-            <a:r>
-              <a:rPr lang="fr-CA" sz="1800" dirty="0">
-                <a:solidFill>
-                  <a:srgbClr val="000000"/>
-                </a:solidFill>
-                <a:effectLst/>
-                <a:latin typeface="Open Sans" panose="020B0606030504020204" pitchFamily="34" charset="0"/>
-                <a:ea typeface="Times New Roman" panose="02020603050405020304" pitchFamily="18" charset="0"/>
-              </a:rPr>
-              <a:t>; </a:t>
-            </a:r>
-            <a:r>
-              <a:rPr lang="fr-CA" sz="1800" dirty="0" err="1">
-                <a:solidFill>
-                  <a:srgbClr val="000000"/>
-                </a:solidFill>
-                <a:effectLst/>
-                <a:latin typeface="Open Sans" panose="020B0606030504020204" pitchFamily="34" charset="0"/>
-                <a:ea typeface="Times New Roman" panose="02020603050405020304" pitchFamily="18" charset="0"/>
-              </a:rPr>
-              <a:t>Mauris</a:t>
-            </a:r>
-            <a:r>
-              <a:rPr lang="fr-CA" sz="1800" dirty="0">
-                <a:solidFill>
-                  <a:srgbClr val="000000"/>
-                </a:solidFill>
-                <a:effectLst/>
-                <a:latin typeface="Open Sans" panose="020B0606030504020204" pitchFamily="34" charset="0"/>
-                <a:ea typeface="Times New Roman" panose="02020603050405020304" pitchFamily="18" charset="0"/>
-              </a:rPr>
-              <a:t> a massa </a:t>
-            </a:r>
-            <a:r>
-              <a:rPr lang="fr-CA" sz="1800" dirty="0" err="1">
-                <a:solidFill>
-                  <a:srgbClr val="000000"/>
-                </a:solidFill>
-                <a:effectLst/>
-                <a:latin typeface="Open Sans" panose="020B0606030504020204" pitchFamily="34" charset="0"/>
-                <a:ea typeface="Times New Roman" panose="02020603050405020304" pitchFamily="18" charset="0"/>
-              </a:rPr>
-              <a:t>viverra</a:t>
-            </a:r>
-            <a:r>
-              <a:rPr lang="fr-CA" sz="1800" dirty="0">
-                <a:solidFill>
-                  <a:srgbClr val="000000"/>
-                </a:solidFill>
-                <a:effectLst/>
-                <a:latin typeface="Open Sans" panose="020B0606030504020204" pitchFamily="34" charset="0"/>
-                <a:ea typeface="Times New Roman" panose="02020603050405020304" pitchFamily="18" charset="0"/>
-              </a:rPr>
-              <a:t> </a:t>
-            </a:r>
-            <a:r>
-              <a:rPr lang="fr-CA" sz="1800" dirty="0" err="1">
-                <a:solidFill>
-                  <a:srgbClr val="000000"/>
-                </a:solidFill>
-                <a:effectLst/>
-                <a:latin typeface="Open Sans" panose="020B0606030504020204" pitchFamily="34" charset="0"/>
-                <a:ea typeface="Times New Roman" panose="02020603050405020304" pitchFamily="18" charset="0"/>
-              </a:rPr>
-              <a:t>mauris</a:t>
-            </a:r>
-            <a:r>
-              <a:rPr lang="fr-CA" sz="1800" dirty="0">
-                <a:solidFill>
-                  <a:srgbClr val="000000"/>
-                </a:solidFill>
-                <a:effectLst/>
-                <a:latin typeface="Open Sans" panose="020B0606030504020204" pitchFamily="34" charset="0"/>
-                <a:ea typeface="Times New Roman" panose="02020603050405020304" pitchFamily="18" charset="0"/>
-              </a:rPr>
-              <a:t> </a:t>
-            </a:r>
-            <a:r>
-              <a:rPr lang="fr-CA" sz="1800" dirty="0" err="1">
-                <a:solidFill>
-                  <a:srgbClr val="000000"/>
-                </a:solidFill>
-                <a:effectLst/>
-                <a:latin typeface="Open Sans" panose="020B0606030504020204" pitchFamily="34" charset="0"/>
-                <a:ea typeface="Times New Roman" panose="02020603050405020304" pitchFamily="18" charset="0"/>
-              </a:rPr>
-              <a:t>ullamcorper</a:t>
-            </a:r>
-            <a:r>
-              <a:rPr lang="fr-CA" sz="1800" dirty="0">
-                <a:solidFill>
-                  <a:srgbClr val="000000"/>
-                </a:solidFill>
-                <a:effectLst/>
-                <a:latin typeface="Open Sans" panose="020B0606030504020204" pitchFamily="34" charset="0"/>
-                <a:ea typeface="Times New Roman" panose="02020603050405020304" pitchFamily="18" charset="0"/>
-              </a:rPr>
-              <a:t> </a:t>
-            </a:r>
-            <a:r>
-              <a:rPr lang="fr-CA" sz="1800" dirty="0" err="1">
-                <a:solidFill>
-                  <a:srgbClr val="000000"/>
-                </a:solidFill>
-                <a:effectLst/>
-                <a:latin typeface="Open Sans" panose="020B0606030504020204" pitchFamily="34" charset="0"/>
-                <a:ea typeface="Times New Roman" panose="02020603050405020304" pitchFamily="18" charset="0"/>
-              </a:rPr>
-              <a:t>vestibulum</a:t>
-            </a:r>
-            <a:r>
-              <a:rPr lang="fr-CA" sz="1800" dirty="0">
-                <a:solidFill>
-                  <a:srgbClr val="000000"/>
-                </a:solidFill>
-                <a:effectLst/>
-                <a:latin typeface="Open Sans" panose="020B0606030504020204" pitchFamily="34" charset="0"/>
-                <a:ea typeface="Times New Roman" panose="02020603050405020304" pitchFamily="18" charset="0"/>
-              </a:rPr>
-              <a:t> non eu </a:t>
-            </a:r>
-            <a:r>
-              <a:rPr lang="fr-CA" sz="1800" dirty="0" err="1">
-                <a:solidFill>
-                  <a:srgbClr val="000000"/>
-                </a:solidFill>
-                <a:effectLst/>
-                <a:latin typeface="Open Sans" panose="020B0606030504020204" pitchFamily="34" charset="0"/>
-                <a:ea typeface="Times New Roman" panose="02020603050405020304" pitchFamily="18" charset="0"/>
-              </a:rPr>
-              <a:t>felis</a:t>
-            </a:r>
-            <a:r>
-              <a:rPr lang="fr-CA" sz="1800" dirty="0">
-                <a:solidFill>
-                  <a:srgbClr val="000000"/>
-                </a:solidFill>
-                <a:effectLst/>
-                <a:latin typeface="Open Sans" panose="020B0606030504020204" pitchFamily="34" charset="0"/>
-                <a:ea typeface="Times New Roman" panose="02020603050405020304" pitchFamily="18" charset="0"/>
-              </a:rPr>
-              <a:t>. </a:t>
-            </a:r>
-            <a:r>
-              <a:rPr lang="fr-CA" sz="1800" dirty="0" err="1">
-                <a:solidFill>
-                  <a:srgbClr val="000000"/>
-                </a:solidFill>
-                <a:effectLst/>
-                <a:latin typeface="Open Sans" panose="020B0606030504020204" pitchFamily="34" charset="0"/>
-                <a:ea typeface="Times New Roman" panose="02020603050405020304" pitchFamily="18" charset="0"/>
-              </a:rPr>
-              <a:t>Donec</a:t>
-            </a:r>
-            <a:r>
-              <a:rPr lang="fr-CA" sz="1800" dirty="0">
-                <a:solidFill>
-                  <a:srgbClr val="000000"/>
-                </a:solidFill>
-                <a:effectLst/>
-                <a:latin typeface="Open Sans" panose="020B0606030504020204" pitchFamily="34" charset="0"/>
-                <a:ea typeface="Times New Roman" panose="02020603050405020304" pitchFamily="18" charset="0"/>
-              </a:rPr>
-              <a:t> </a:t>
-            </a:r>
-            <a:r>
-              <a:rPr lang="fr-CA" sz="1800" dirty="0" err="1">
-                <a:solidFill>
-                  <a:srgbClr val="000000"/>
-                </a:solidFill>
-                <a:effectLst/>
-                <a:latin typeface="Open Sans" panose="020B0606030504020204" pitchFamily="34" charset="0"/>
-                <a:ea typeface="Times New Roman" panose="02020603050405020304" pitchFamily="18" charset="0"/>
-              </a:rPr>
-              <a:t>ultrices</a:t>
-            </a:r>
-            <a:r>
-              <a:rPr lang="fr-CA" sz="1800" dirty="0">
-                <a:solidFill>
-                  <a:srgbClr val="000000"/>
-                </a:solidFill>
-                <a:effectLst/>
-                <a:latin typeface="Open Sans" panose="020B0606030504020204" pitchFamily="34" charset="0"/>
-                <a:ea typeface="Times New Roman" panose="02020603050405020304" pitchFamily="18" charset="0"/>
-              </a:rPr>
-              <a:t>, </a:t>
-            </a:r>
-            <a:r>
-              <a:rPr lang="fr-CA" sz="1800" dirty="0" err="1">
-                <a:solidFill>
-                  <a:srgbClr val="000000"/>
-                </a:solidFill>
-                <a:effectLst/>
-                <a:latin typeface="Open Sans" panose="020B0606030504020204" pitchFamily="34" charset="0"/>
-                <a:ea typeface="Times New Roman" panose="02020603050405020304" pitchFamily="18" charset="0"/>
-              </a:rPr>
-              <a:t>justo</a:t>
-            </a:r>
-            <a:r>
-              <a:rPr lang="fr-CA" sz="1800" dirty="0">
-                <a:solidFill>
-                  <a:srgbClr val="000000"/>
-                </a:solidFill>
-                <a:effectLst/>
-                <a:latin typeface="Open Sans" panose="020B0606030504020204" pitchFamily="34" charset="0"/>
-                <a:ea typeface="Times New Roman" panose="02020603050405020304" pitchFamily="18" charset="0"/>
-              </a:rPr>
-              <a:t> </a:t>
-            </a:r>
-            <a:r>
-              <a:rPr lang="fr-CA" sz="1800" dirty="0" err="1">
-                <a:solidFill>
-                  <a:srgbClr val="000000"/>
-                </a:solidFill>
-                <a:effectLst/>
-                <a:latin typeface="Open Sans" panose="020B0606030504020204" pitchFamily="34" charset="0"/>
-                <a:ea typeface="Times New Roman" panose="02020603050405020304" pitchFamily="18" charset="0"/>
-              </a:rPr>
-              <a:t>vel</a:t>
-            </a:r>
-            <a:r>
-              <a:rPr lang="fr-CA" sz="1800" dirty="0">
-                <a:solidFill>
-                  <a:srgbClr val="000000"/>
-                </a:solidFill>
-                <a:effectLst/>
-                <a:latin typeface="Open Sans" panose="020B0606030504020204" pitchFamily="34" charset="0"/>
-                <a:ea typeface="Times New Roman" panose="02020603050405020304" pitchFamily="18" charset="0"/>
-              </a:rPr>
-              <a:t> </a:t>
-            </a:r>
-            <a:r>
-              <a:rPr lang="fr-CA" sz="1800" dirty="0" err="1">
-                <a:solidFill>
-                  <a:srgbClr val="000000"/>
-                </a:solidFill>
-                <a:effectLst/>
-                <a:latin typeface="Open Sans" panose="020B0606030504020204" pitchFamily="34" charset="0"/>
-                <a:ea typeface="Times New Roman" panose="02020603050405020304" pitchFamily="18" charset="0"/>
-              </a:rPr>
-              <a:t>fermentum</a:t>
-            </a:r>
-            <a:r>
-              <a:rPr lang="fr-CA" sz="1800" dirty="0">
-                <a:solidFill>
-                  <a:srgbClr val="000000"/>
-                </a:solidFill>
-                <a:effectLst/>
-                <a:latin typeface="Open Sans" panose="020B0606030504020204" pitchFamily="34" charset="0"/>
-                <a:ea typeface="Times New Roman" panose="02020603050405020304" pitchFamily="18" charset="0"/>
-              </a:rPr>
-              <a:t> </a:t>
-            </a:r>
-            <a:r>
-              <a:rPr lang="fr-CA" sz="1800" dirty="0" err="1">
-                <a:solidFill>
-                  <a:srgbClr val="000000"/>
-                </a:solidFill>
-                <a:effectLst/>
-                <a:latin typeface="Open Sans" panose="020B0606030504020204" pitchFamily="34" charset="0"/>
-                <a:ea typeface="Times New Roman" panose="02020603050405020304" pitchFamily="18" charset="0"/>
-              </a:rPr>
-              <a:t>fringilla</a:t>
-            </a:r>
-            <a:r>
-              <a:rPr lang="fr-CA" sz="1800" dirty="0">
-                <a:solidFill>
-                  <a:srgbClr val="000000"/>
-                </a:solidFill>
-                <a:effectLst/>
-                <a:latin typeface="Open Sans" panose="020B0606030504020204" pitchFamily="34" charset="0"/>
-                <a:ea typeface="Times New Roman" panose="02020603050405020304" pitchFamily="18" charset="0"/>
-              </a:rPr>
-              <a:t>, </a:t>
-            </a:r>
-            <a:r>
-              <a:rPr lang="fr-CA" sz="1800" dirty="0" err="1">
-                <a:solidFill>
-                  <a:srgbClr val="000000"/>
-                </a:solidFill>
-                <a:effectLst/>
-                <a:latin typeface="Open Sans" panose="020B0606030504020204" pitchFamily="34" charset="0"/>
-                <a:ea typeface="Times New Roman" panose="02020603050405020304" pitchFamily="18" charset="0"/>
-              </a:rPr>
-              <a:t>arcu</a:t>
-            </a:r>
-            <a:r>
-              <a:rPr lang="fr-CA" sz="1800" dirty="0">
-                <a:solidFill>
-                  <a:srgbClr val="000000"/>
-                </a:solidFill>
-                <a:effectLst/>
-                <a:latin typeface="Open Sans" panose="020B0606030504020204" pitchFamily="34" charset="0"/>
-                <a:ea typeface="Times New Roman" panose="02020603050405020304" pitchFamily="18" charset="0"/>
-              </a:rPr>
-              <a:t> </a:t>
-            </a:r>
-            <a:r>
-              <a:rPr lang="fr-CA" sz="1800" dirty="0" err="1">
-                <a:solidFill>
-                  <a:srgbClr val="000000"/>
-                </a:solidFill>
-                <a:effectLst/>
-                <a:latin typeface="Open Sans" panose="020B0606030504020204" pitchFamily="34" charset="0"/>
-                <a:ea typeface="Times New Roman" panose="02020603050405020304" pitchFamily="18" charset="0"/>
-              </a:rPr>
-              <a:t>ligula</a:t>
-            </a:r>
-            <a:r>
-              <a:rPr lang="fr-CA" sz="1800" dirty="0">
-                <a:solidFill>
-                  <a:srgbClr val="000000"/>
-                </a:solidFill>
-                <a:effectLst/>
-                <a:latin typeface="Open Sans" panose="020B0606030504020204" pitchFamily="34" charset="0"/>
-                <a:ea typeface="Times New Roman" panose="02020603050405020304" pitchFamily="18" charset="0"/>
-              </a:rPr>
-              <a:t> </a:t>
-            </a:r>
-            <a:r>
-              <a:rPr lang="fr-CA" sz="1800" dirty="0" err="1">
-                <a:solidFill>
-                  <a:srgbClr val="000000"/>
-                </a:solidFill>
-                <a:effectLst/>
-                <a:latin typeface="Open Sans" panose="020B0606030504020204" pitchFamily="34" charset="0"/>
-                <a:ea typeface="Times New Roman" panose="02020603050405020304" pitchFamily="18" charset="0"/>
-              </a:rPr>
-              <a:t>ultrices</a:t>
-            </a:r>
-            <a:r>
-              <a:rPr lang="fr-CA" sz="1800" dirty="0">
-                <a:solidFill>
-                  <a:srgbClr val="000000"/>
-                </a:solidFill>
-                <a:effectLst/>
-                <a:latin typeface="Open Sans" panose="020B0606030504020204" pitchFamily="34" charset="0"/>
-                <a:ea typeface="Times New Roman" panose="02020603050405020304" pitchFamily="18" charset="0"/>
-              </a:rPr>
-              <a:t> </a:t>
-            </a:r>
-            <a:r>
-              <a:rPr lang="fr-CA" sz="1800" dirty="0" err="1">
-                <a:solidFill>
-                  <a:srgbClr val="000000"/>
-                </a:solidFill>
-                <a:effectLst/>
-                <a:latin typeface="Open Sans" panose="020B0606030504020204" pitchFamily="34" charset="0"/>
-                <a:ea typeface="Times New Roman" panose="02020603050405020304" pitchFamily="18" charset="0"/>
-              </a:rPr>
-              <a:t>purus</a:t>
-            </a:r>
-            <a:r>
-              <a:rPr lang="fr-CA" sz="1800" dirty="0">
-                <a:solidFill>
-                  <a:srgbClr val="000000"/>
-                </a:solidFill>
-                <a:effectLst/>
-                <a:latin typeface="Open Sans" panose="020B0606030504020204" pitchFamily="34" charset="0"/>
-                <a:ea typeface="Times New Roman" panose="02020603050405020304" pitchFamily="18" charset="0"/>
-              </a:rPr>
-              <a:t>, </a:t>
-            </a:r>
-            <a:r>
-              <a:rPr lang="fr-CA" sz="1800" dirty="0" err="1">
-                <a:solidFill>
-                  <a:srgbClr val="000000"/>
-                </a:solidFill>
-                <a:effectLst/>
-                <a:latin typeface="Open Sans" panose="020B0606030504020204" pitchFamily="34" charset="0"/>
-                <a:ea typeface="Times New Roman" panose="02020603050405020304" pitchFamily="18" charset="0"/>
-              </a:rPr>
-              <a:t>vel</a:t>
-            </a:r>
-            <a:r>
-              <a:rPr lang="fr-CA" sz="1800" dirty="0">
-                <a:solidFill>
-                  <a:srgbClr val="000000"/>
-                </a:solidFill>
-                <a:effectLst/>
-                <a:latin typeface="Open Sans" panose="020B0606030504020204" pitchFamily="34" charset="0"/>
-                <a:ea typeface="Times New Roman" panose="02020603050405020304" pitchFamily="18" charset="0"/>
-              </a:rPr>
-              <a:t> </a:t>
-            </a:r>
-            <a:r>
-              <a:rPr lang="fr-CA" sz="1800" dirty="0" err="1">
-                <a:solidFill>
-                  <a:srgbClr val="000000"/>
-                </a:solidFill>
-                <a:effectLst/>
-                <a:latin typeface="Open Sans" panose="020B0606030504020204" pitchFamily="34" charset="0"/>
-                <a:ea typeface="Times New Roman" panose="02020603050405020304" pitchFamily="18" charset="0"/>
-              </a:rPr>
-              <a:t>rutrum</a:t>
-            </a:r>
-            <a:r>
-              <a:rPr lang="fr-CA" sz="1800" dirty="0">
-                <a:solidFill>
-                  <a:srgbClr val="000000"/>
-                </a:solidFill>
-                <a:effectLst/>
-                <a:latin typeface="Open Sans" panose="020B0606030504020204" pitchFamily="34" charset="0"/>
-                <a:ea typeface="Times New Roman" panose="02020603050405020304" pitchFamily="18" charset="0"/>
-              </a:rPr>
-              <a:t> massa </a:t>
-            </a:r>
-            <a:r>
-              <a:rPr lang="fr-CA" sz="1800" dirty="0" err="1">
-                <a:solidFill>
-                  <a:srgbClr val="000000"/>
-                </a:solidFill>
-                <a:effectLst/>
-                <a:latin typeface="Open Sans" panose="020B0606030504020204" pitchFamily="34" charset="0"/>
-                <a:ea typeface="Times New Roman" panose="02020603050405020304" pitchFamily="18" charset="0"/>
-              </a:rPr>
-              <a:t>dolor</a:t>
-            </a:r>
-            <a:r>
-              <a:rPr lang="fr-CA" sz="1800" dirty="0">
-                <a:solidFill>
-                  <a:srgbClr val="000000"/>
-                </a:solidFill>
-                <a:effectLst/>
-                <a:latin typeface="Open Sans" panose="020B0606030504020204" pitchFamily="34" charset="0"/>
-                <a:ea typeface="Times New Roman" panose="02020603050405020304" pitchFamily="18" charset="0"/>
-              </a:rPr>
-              <a:t> eu </a:t>
-            </a:r>
-            <a:r>
-              <a:rPr lang="fr-CA" sz="1800" dirty="0" err="1">
-                <a:solidFill>
-                  <a:srgbClr val="000000"/>
-                </a:solidFill>
-                <a:effectLst/>
-                <a:latin typeface="Open Sans" panose="020B0606030504020204" pitchFamily="34" charset="0"/>
-                <a:ea typeface="Times New Roman" panose="02020603050405020304" pitchFamily="18" charset="0"/>
-              </a:rPr>
-              <a:t>velit</a:t>
-            </a:r>
-            <a:r>
-              <a:rPr lang="fr-CA" sz="1800" dirty="0">
-                <a:solidFill>
-                  <a:srgbClr val="000000"/>
-                </a:solidFill>
-                <a:effectLst/>
-                <a:latin typeface="Open Sans" panose="020B0606030504020204" pitchFamily="34" charset="0"/>
-                <a:ea typeface="Times New Roman" panose="02020603050405020304" pitchFamily="18" charset="0"/>
-              </a:rPr>
-              <a:t>. Duis </a:t>
-            </a:r>
-            <a:r>
-              <a:rPr lang="fr-CA" sz="1800" dirty="0" err="1">
-                <a:solidFill>
-                  <a:srgbClr val="000000"/>
-                </a:solidFill>
-                <a:effectLst/>
-                <a:latin typeface="Open Sans" panose="020B0606030504020204" pitchFamily="34" charset="0"/>
-                <a:ea typeface="Times New Roman" panose="02020603050405020304" pitchFamily="18" charset="0"/>
-              </a:rPr>
-              <a:t>eleifend</a:t>
-            </a:r>
-            <a:r>
-              <a:rPr lang="fr-CA" sz="1800" dirty="0">
-                <a:solidFill>
-                  <a:srgbClr val="000000"/>
-                </a:solidFill>
-                <a:effectLst/>
-                <a:latin typeface="Open Sans" panose="020B0606030504020204" pitchFamily="34" charset="0"/>
-                <a:ea typeface="Times New Roman" panose="02020603050405020304" pitchFamily="18" charset="0"/>
-              </a:rPr>
-              <a:t> id libero nec </a:t>
-            </a:r>
-            <a:r>
-              <a:rPr lang="fr-CA" sz="1800" dirty="0" err="1">
-                <a:solidFill>
-                  <a:srgbClr val="000000"/>
-                </a:solidFill>
-                <a:effectLst/>
-                <a:latin typeface="Open Sans" panose="020B0606030504020204" pitchFamily="34" charset="0"/>
-                <a:ea typeface="Times New Roman" panose="02020603050405020304" pitchFamily="18" charset="0"/>
-              </a:rPr>
-              <a:t>accumsan</a:t>
-            </a:r>
-            <a:r>
-              <a:rPr lang="fr-CA" sz="1800" dirty="0">
-                <a:solidFill>
-                  <a:srgbClr val="000000"/>
-                </a:solidFill>
-                <a:effectLst/>
-                <a:latin typeface="Open Sans" panose="020B0606030504020204" pitchFamily="34" charset="0"/>
-                <a:ea typeface="Times New Roman" panose="02020603050405020304" pitchFamily="18" charset="0"/>
-              </a:rPr>
-              <a:t>. </a:t>
-            </a:r>
-            <a:r>
-              <a:rPr lang="fr-CA" sz="1800" dirty="0" err="1">
-                <a:solidFill>
-                  <a:srgbClr val="000000"/>
-                </a:solidFill>
-                <a:effectLst/>
-                <a:latin typeface="Open Sans" panose="020B0606030504020204" pitchFamily="34" charset="0"/>
-                <a:ea typeface="Times New Roman" panose="02020603050405020304" pitchFamily="18" charset="0"/>
-              </a:rPr>
-              <a:t>Fusce</a:t>
-            </a:r>
-            <a:r>
-              <a:rPr lang="fr-CA" sz="1800" dirty="0">
-                <a:solidFill>
-                  <a:srgbClr val="000000"/>
-                </a:solidFill>
-                <a:effectLst/>
-                <a:latin typeface="Open Sans" panose="020B0606030504020204" pitchFamily="34" charset="0"/>
-                <a:ea typeface="Times New Roman" panose="02020603050405020304" pitchFamily="18" charset="0"/>
-              </a:rPr>
-              <a:t> </a:t>
-            </a:r>
-            <a:r>
-              <a:rPr lang="fr-CA" sz="1800" dirty="0" err="1">
-                <a:solidFill>
-                  <a:srgbClr val="000000"/>
-                </a:solidFill>
-                <a:effectLst/>
-                <a:latin typeface="Open Sans" panose="020B0606030504020204" pitchFamily="34" charset="0"/>
-                <a:ea typeface="Times New Roman" panose="02020603050405020304" pitchFamily="18" charset="0"/>
-              </a:rPr>
-              <a:t>vestibulum</a:t>
-            </a:r>
-            <a:r>
-              <a:rPr lang="fr-CA" sz="1800" dirty="0">
-                <a:solidFill>
-                  <a:srgbClr val="000000"/>
-                </a:solidFill>
-                <a:effectLst/>
-                <a:latin typeface="Open Sans" panose="020B0606030504020204" pitchFamily="34" charset="0"/>
-                <a:ea typeface="Times New Roman" panose="02020603050405020304" pitchFamily="18" charset="0"/>
-              </a:rPr>
-              <a:t> </a:t>
-            </a:r>
-            <a:r>
-              <a:rPr lang="fr-CA" sz="1800" dirty="0" err="1">
-                <a:solidFill>
-                  <a:srgbClr val="000000"/>
-                </a:solidFill>
-                <a:effectLst/>
-                <a:latin typeface="Open Sans" panose="020B0606030504020204" pitchFamily="34" charset="0"/>
-                <a:ea typeface="Times New Roman" panose="02020603050405020304" pitchFamily="18" charset="0"/>
-              </a:rPr>
-              <a:t>tortor</a:t>
-            </a:r>
-            <a:r>
-              <a:rPr lang="fr-CA" sz="1800" dirty="0">
-                <a:solidFill>
-                  <a:srgbClr val="000000"/>
-                </a:solidFill>
-                <a:effectLst/>
-                <a:latin typeface="Open Sans" panose="020B0606030504020204" pitchFamily="34" charset="0"/>
-                <a:ea typeface="Times New Roman" panose="02020603050405020304" pitchFamily="18" charset="0"/>
-              </a:rPr>
-              <a:t> </a:t>
-            </a:r>
-            <a:r>
-              <a:rPr lang="fr-CA" sz="1800" dirty="0" err="1">
-                <a:solidFill>
-                  <a:srgbClr val="000000"/>
-                </a:solidFill>
-                <a:effectLst/>
-                <a:latin typeface="Open Sans" panose="020B0606030504020204" pitchFamily="34" charset="0"/>
-                <a:ea typeface="Times New Roman" panose="02020603050405020304" pitchFamily="18" charset="0"/>
-              </a:rPr>
-              <a:t>sed</a:t>
-            </a:r>
-            <a:r>
-              <a:rPr lang="fr-CA" sz="1800" dirty="0">
-                <a:solidFill>
-                  <a:srgbClr val="000000"/>
-                </a:solidFill>
-                <a:effectLst/>
-                <a:latin typeface="Open Sans" panose="020B0606030504020204" pitchFamily="34" charset="0"/>
-                <a:ea typeface="Times New Roman" panose="02020603050405020304" pitchFamily="18" charset="0"/>
-              </a:rPr>
-              <a:t> massa commodo </a:t>
-            </a:r>
-            <a:r>
-              <a:rPr lang="fr-CA" sz="1800" dirty="0" err="1">
-                <a:solidFill>
-                  <a:srgbClr val="000000"/>
-                </a:solidFill>
-                <a:effectLst/>
-                <a:latin typeface="Open Sans" panose="020B0606030504020204" pitchFamily="34" charset="0"/>
-                <a:ea typeface="Times New Roman" panose="02020603050405020304" pitchFamily="18" charset="0"/>
-              </a:rPr>
-              <a:t>convallis</a:t>
-            </a:r>
-            <a:r>
-              <a:rPr lang="fr-CA" sz="1800" dirty="0">
-                <a:solidFill>
-                  <a:srgbClr val="000000"/>
-                </a:solidFill>
-                <a:effectLst/>
-                <a:latin typeface="Open Sans" panose="020B0606030504020204" pitchFamily="34" charset="0"/>
-                <a:ea typeface="Times New Roman" panose="02020603050405020304" pitchFamily="18" charset="0"/>
-              </a:rPr>
-              <a:t>. Cras </a:t>
-            </a:r>
-            <a:r>
-              <a:rPr lang="fr-CA" sz="1800" dirty="0" err="1">
-                <a:solidFill>
-                  <a:srgbClr val="000000"/>
-                </a:solidFill>
-                <a:effectLst/>
-                <a:latin typeface="Open Sans" panose="020B0606030504020204" pitchFamily="34" charset="0"/>
-                <a:ea typeface="Times New Roman" panose="02020603050405020304" pitchFamily="18" charset="0"/>
-              </a:rPr>
-              <a:t>pharetra</a:t>
-            </a:r>
-            <a:r>
-              <a:rPr lang="fr-CA" sz="1800" dirty="0">
-                <a:solidFill>
-                  <a:srgbClr val="000000"/>
-                </a:solidFill>
-                <a:effectLst/>
-                <a:latin typeface="Open Sans" panose="020B0606030504020204" pitchFamily="34" charset="0"/>
-                <a:ea typeface="Times New Roman" panose="02020603050405020304" pitchFamily="18" charset="0"/>
-              </a:rPr>
-              <a:t> erat </a:t>
-            </a:r>
-            <a:r>
-              <a:rPr lang="fr-CA" sz="1800" dirty="0" err="1">
-                <a:solidFill>
-                  <a:srgbClr val="000000"/>
-                </a:solidFill>
-                <a:effectLst/>
-                <a:latin typeface="Open Sans" panose="020B0606030504020204" pitchFamily="34" charset="0"/>
-                <a:ea typeface="Times New Roman" panose="02020603050405020304" pitchFamily="18" charset="0"/>
-              </a:rPr>
-              <a:t>venenatis</a:t>
-            </a:r>
-            <a:r>
-              <a:rPr lang="fr-CA" sz="1800" dirty="0">
-                <a:solidFill>
-                  <a:srgbClr val="000000"/>
-                </a:solidFill>
-                <a:effectLst/>
-                <a:latin typeface="Open Sans" panose="020B0606030504020204" pitchFamily="34" charset="0"/>
-                <a:ea typeface="Times New Roman" panose="02020603050405020304" pitchFamily="18" charset="0"/>
-              </a:rPr>
-              <a:t>, </a:t>
-            </a:r>
-            <a:r>
-              <a:rPr lang="fr-CA" sz="1800" dirty="0" err="1">
-                <a:solidFill>
-                  <a:srgbClr val="000000"/>
-                </a:solidFill>
-                <a:effectLst/>
-                <a:latin typeface="Open Sans" panose="020B0606030504020204" pitchFamily="34" charset="0"/>
-                <a:ea typeface="Times New Roman" panose="02020603050405020304" pitchFamily="18" charset="0"/>
-              </a:rPr>
-              <a:t>euismod</a:t>
-            </a:r>
-            <a:r>
-              <a:rPr lang="fr-CA" sz="1800" dirty="0">
-                <a:solidFill>
-                  <a:srgbClr val="000000"/>
-                </a:solidFill>
-                <a:effectLst/>
-                <a:latin typeface="Open Sans" panose="020B0606030504020204" pitchFamily="34" charset="0"/>
-                <a:ea typeface="Times New Roman" panose="02020603050405020304" pitchFamily="18" charset="0"/>
-              </a:rPr>
-              <a:t> mi non, </a:t>
-            </a:r>
-            <a:r>
-              <a:rPr lang="fr-CA" sz="1800" dirty="0" err="1">
-                <a:solidFill>
-                  <a:srgbClr val="000000"/>
-                </a:solidFill>
-                <a:effectLst/>
-                <a:latin typeface="Open Sans" panose="020B0606030504020204" pitchFamily="34" charset="0"/>
-                <a:ea typeface="Times New Roman" panose="02020603050405020304" pitchFamily="18" charset="0"/>
-              </a:rPr>
-              <a:t>venenatis</a:t>
-            </a:r>
-            <a:r>
-              <a:rPr lang="fr-CA" sz="1800" dirty="0">
-                <a:solidFill>
-                  <a:srgbClr val="000000"/>
-                </a:solidFill>
-                <a:effectLst/>
-                <a:latin typeface="Open Sans" panose="020B0606030504020204" pitchFamily="34" charset="0"/>
-                <a:ea typeface="Times New Roman" panose="02020603050405020304" pitchFamily="18" charset="0"/>
-              </a:rPr>
-              <a:t> </a:t>
-            </a:r>
-            <a:r>
-              <a:rPr lang="fr-CA" sz="1800" dirty="0" err="1">
-                <a:solidFill>
-                  <a:srgbClr val="000000"/>
-                </a:solidFill>
-                <a:effectLst/>
-                <a:latin typeface="Open Sans" panose="020B0606030504020204" pitchFamily="34" charset="0"/>
-                <a:ea typeface="Times New Roman" panose="02020603050405020304" pitchFamily="18" charset="0"/>
-              </a:rPr>
-              <a:t>felis</a:t>
-            </a:r>
-            <a:r>
-              <a:rPr lang="fr-CA" sz="1800" dirty="0">
-                <a:solidFill>
-                  <a:srgbClr val="000000"/>
-                </a:solidFill>
-                <a:effectLst/>
-                <a:latin typeface="Open Sans" panose="020B0606030504020204" pitchFamily="34" charset="0"/>
-                <a:ea typeface="Times New Roman" panose="02020603050405020304" pitchFamily="18" charset="0"/>
-              </a:rPr>
-              <a:t>. Nunc vitae </a:t>
-            </a:r>
-            <a:r>
-              <a:rPr lang="fr-CA" sz="1800" dirty="0" err="1">
-                <a:solidFill>
-                  <a:srgbClr val="000000"/>
-                </a:solidFill>
-                <a:effectLst/>
-                <a:latin typeface="Open Sans" panose="020B0606030504020204" pitchFamily="34" charset="0"/>
-                <a:ea typeface="Times New Roman" panose="02020603050405020304" pitchFamily="18" charset="0"/>
-              </a:rPr>
-              <a:t>vehicula</a:t>
-            </a:r>
-            <a:r>
-              <a:rPr lang="fr-CA" sz="1800" dirty="0">
-                <a:solidFill>
-                  <a:srgbClr val="000000"/>
-                </a:solidFill>
-                <a:effectLst/>
-                <a:latin typeface="Open Sans" panose="020B0606030504020204" pitchFamily="34" charset="0"/>
-                <a:ea typeface="Times New Roman" panose="02020603050405020304" pitchFamily="18" charset="0"/>
-              </a:rPr>
-              <a:t> mi. </a:t>
-            </a:r>
-            <a:r>
-              <a:rPr lang="fr-CA" sz="1800" dirty="0" err="1">
-                <a:solidFill>
-                  <a:srgbClr val="000000"/>
-                </a:solidFill>
-                <a:effectLst/>
-                <a:latin typeface="Open Sans" panose="020B0606030504020204" pitchFamily="34" charset="0"/>
-                <a:ea typeface="Times New Roman" panose="02020603050405020304" pitchFamily="18" charset="0"/>
-              </a:rPr>
-              <a:t>Nulla</a:t>
-            </a:r>
-            <a:r>
-              <a:rPr lang="fr-CA" sz="1800" dirty="0">
-                <a:solidFill>
-                  <a:srgbClr val="000000"/>
-                </a:solidFill>
-                <a:effectLst/>
-                <a:latin typeface="Open Sans" panose="020B0606030504020204" pitchFamily="34" charset="0"/>
-                <a:ea typeface="Times New Roman" panose="02020603050405020304" pitchFamily="18" charset="0"/>
-              </a:rPr>
-              <a:t> </a:t>
-            </a:r>
-            <a:r>
-              <a:rPr lang="fr-CA" sz="1800" dirty="0" err="1">
-                <a:solidFill>
-                  <a:srgbClr val="000000"/>
-                </a:solidFill>
-                <a:effectLst/>
-                <a:latin typeface="Open Sans" panose="020B0606030504020204" pitchFamily="34" charset="0"/>
-                <a:ea typeface="Times New Roman" panose="02020603050405020304" pitchFamily="18" charset="0"/>
-              </a:rPr>
-              <a:t>rutrum</a:t>
-            </a:r>
-            <a:r>
-              <a:rPr lang="fr-CA" sz="1800" dirty="0">
-                <a:solidFill>
-                  <a:srgbClr val="000000"/>
-                </a:solidFill>
-                <a:effectLst/>
-                <a:latin typeface="Open Sans" panose="020B0606030504020204" pitchFamily="34" charset="0"/>
-                <a:ea typeface="Times New Roman" panose="02020603050405020304" pitchFamily="18" charset="0"/>
-              </a:rPr>
-              <a:t> </a:t>
-            </a:r>
-            <a:r>
-              <a:rPr lang="fr-CA" sz="1800" dirty="0" err="1">
-                <a:solidFill>
-                  <a:srgbClr val="000000"/>
-                </a:solidFill>
-                <a:effectLst/>
-                <a:latin typeface="Open Sans" panose="020B0606030504020204" pitchFamily="34" charset="0"/>
-                <a:ea typeface="Times New Roman" panose="02020603050405020304" pitchFamily="18" charset="0"/>
-              </a:rPr>
-              <a:t>justo</a:t>
-            </a:r>
-            <a:r>
-              <a:rPr lang="fr-CA" sz="1800" dirty="0">
-                <a:solidFill>
-                  <a:srgbClr val="000000"/>
-                </a:solidFill>
-                <a:effectLst/>
-                <a:latin typeface="Open Sans" panose="020B0606030504020204" pitchFamily="34" charset="0"/>
-                <a:ea typeface="Times New Roman" panose="02020603050405020304" pitchFamily="18" charset="0"/>
-              </a:rPr>
-              <a:t> </a:t>
-            </a:r>
-            <a:r>
-              <a:rPr lang="fr-CA" sz="1800" dirty="0" err="1">
-                <a:solidFill>
-                  <a:srgbClr val="000000"/>
-                </a:solidFill>
-                <a:effectLst/>
-                <a:latin typeface="Open Sans" panose="020B0606030504020204" pitchFamily="34" charset="0"/>
-                <a:ea typeface="Times New Roman" panose="02020603050405020304" pitchFamily="18" charset="0"/>
-              </a:rPr>
-              <a:t>arcu</a:t>
-            </a:r>
-            <a:r>
-              <a:rPr lang="fr-CA" sz="1800" dirty="0">
-                <a:solidFill>
-                  <a:srgbClr val="000000"/>
-                </a:solidFill>
-                <a:effectLst/>
-                <a:latin typeface="Open Sans" panose="020B0606030504020204" pitchFamily="34" charset="0"/>
-                <a:ea typeface="Times New Roman" panose="02020603050405020304" pitchFamily="18" charset="0"/>
-              </a:rPr>
-              <a:t>, a </a:t>
-            </a:r>
-            <a:r>
-              <a:rPr lang="fr-CA" sz="1800" dirty="0" err="1">
-                <a:solidFill>
-                  <a:srgbClr val="000000"/>
-                </a:solidFill>
-                <a:effectLst/>
-                <a:latin typeface="Open Sans" panose="020B0606030504020204" pitchFamily="34" charset="0"/>
-                <a:ea typeface="Times New Roman" panose="02020603050405020304" pitchFamily="18" charset="0"/>
-              </a:rPr>
-              <a:t>feugiat</a:t>
-            </a:r>
-            <a:r>
-              <a:rPr lang="fr-CA" sz="1800" dirty="0">
-                <a:solidFill>
-                  <a:srgbClr val="000000"/>
-                </a:solidFill>
-                <a:effectLst/>
-                <a:latin typeface="Open Sans" panose="020B0606030504020204" pitchFamily="34" charset="0"/>
-                <a:ea typeface="Times New Roman" panose="02020603050405020304" pitchFamily="18" charset="0"/>
-              </a:rPr>
-              <a:t> </a:t>
-            </a:r>
-            <a:r>
-              <a:rPr lang="fr-CA" sz="1800" dirty="0" err="1">
-                <a:solidFill>
-                  <a:srgbClr val="000000"/>
-                </a:solidFill>
-                <a:effectLst/>
-                <a:latin typeface="Open Sans" panose="020B0606030504020204" pitchFamily="34" charset="0"/>
-                <a:ea typeface="Times New Roman" panose="02020603050405020304" pitchFamily="18" charset="0"/>
-              </a:rPr>
-              <a:t>arcu</a:t>
-            </a:r>
-            <a:r>
-              <a:rPr lang="fr-CA" sz="1800" dirty="0">
-                <a:solidFill>
-                  <a:srgbClr val="000000"/>
-                </a:solidFill>
-                <a:effectLst/>
-                <a:latin typeface="Open Sans" panose="020B0606030504020204" pitchFamily="34" charset="0"/>
-                <a:ea typeface="Times New Roman" panose="02020603050405020304" pitchFamily="18" charset="0"/>
-              </a:rPr>
-              <a:t> </a:t>
-            </a:r>
-            <a:r>
-              <a:rPr lang="fr-CA" sz="1800" dirty="0" err="1">
-                <a:solidFill>
-                  <a:srgbClr val="000000"/>
-                </a:solidFill>
-                <a:effectLst/>
-                <a:latin typeface="Open Sans" panose="020B0606030504020204" pitchFamily="34" charset="0"/>
-                <a:ea typeface="Times New Roman" panose="02020603050405020304" pitchFamily="18" charset="0"/>
-              </a:rPr>
-              <a:t>suscipit</a:t>
-            </a:r>
-            <a:r>
-              <a:rPr lang="fr-CA" sz="1800" dirty="0">
-                <a:solidFill>
-                  <a:srgbClr val="000000"/>
-                </a:solidFill>
-                <a:effectLst/>
-                <a:latin typeface="Open Sans" panose="020B0606030504020204" pitchFamily="34" charset="0"/>
-                <a:ea typeface="Times New Roman" panose="02020603050405020304" pitchFamily="18" charset="0"/>
-              </a:rPr>
-              <a:t> nec. Morbi id </a:t>
-            </a:r>
-            <a:r>
-              <a:rPr lang="fr-CA" sz="1800" dirty="0" err="1">
-                <a:solidFill>
-                  <a:srgbClr val="000000"/>
-                </a:solidFill>
-                <a:effectLst/>
-                <a:latin typeface="Open Sans" panose="020B0606030504020204" pitchFamily="34" charset="0"/>
-                <a:ea typeface="Times New Roman" panose="02020603050405020304" pitchFamily="18" charset="0"/>
-              </a:rPr>
-              <a:t>odio</a:t>
-            </a:r>
-            <a:r>
-              <a:rPr lang="fr-CA" sz="1800" dirty="0">
-                <a:solidFill>
-                  <a:srgbClr val="000000"/>
-                </a:solidFill>
-                <a:effectLst/>
-                <a:latin typeface="Open Sans" panose="020B0606030504020204" pitchFamily="34" charset="0"/>
-                <a:ea typeface="Times New Roman" panose="02020603050405020304" pitchFamily="18" charset="0"/>
-              </a:rPr>
-              <a:t> eu massa </a:t>
-            </a:r>
-            <a:r>
-              <a:rPr lang="fr-CA" sz="1800" dirty="0" err="1">
-                <a:solidFill>
-                  <a:srgbClr val="000000"/>
-                </a:solidFill>
-                <a:effectLst/>
-                <a:latin typeface="Open Sans" panose="020B0606030504020204" pitchFamily="34" charset="0"/>
-                <a:ea typeface="Times New Roman" panose="02020603050405020304" pitchFamily="18" charset="0"/>
-              </a:rPr>
-              <a:t>convallis</a:t>
-            </a:r>
-            <a:r>
-              <a:rPr lang="fr-CA" sz="1800" dirty="0">
-                <a:solidFill>
-                  <a:srgbClr val="000000"/>
-                </a:solidFill>
-                <a:effectLst/>
-                <a:latin typeface="Open Sans" panose="020B0606030504020204" pitchFamily="34" charset="0"/>
-                <a:ea typeface="Times New Roman" panose="02020603050405020304" pitchFamily="18" charset="0"/>
-              </a:rPr>
-              <a:t> </a:t>
-            </a:r>
-            <a:r>
-              <a:rPr lang="fr-CA" sz="1800" dirty="0" err="1">
-                <a:solidFill>
-                  <a:srgbClr val="000000"/>
-                </a:solidFill>
-                <a:effectLst/>
-                <a:latin typeface="Open Sans" panose="020B0606030504020204" pitchFamily="34" charset="0"/>
-                <a:ea typeface="Times New Roman" panose="02020603050405020304" pitchFamily="18" charset="0"/>
-              </a:rPr>
-              <a:t>ornare</a:t>
-            </a:r>
-            <a:r>
-              <a:rPr lang="fr-CA" sz="1800" dirty="0">
-                <a:solidFill>
-                  <a:srgbClr val="000000"/>
-                </a:solidFill>
-                <a:effectLst/>
-                <a:latin typeface="Open Sans" panose="020B0606030504020204" pitchFamily="34" charset="0"/>
-                <a:ea typeface="Times New Roman" panose="02020603050405020304" pitchFamily="18" charset="0"/>
-              </a:rPr>
-              <a:t> eu nec </a:t>
-            </a:r>
-            <a:r>
-              <a:rPr lang="fr-CA" sz="1800" dirty="0" err="1">
-                <a:solidFill>
-                  <a:srgbClr val="000000"/>
-                </a:solidFill>
-                <a:effectLst/>
-                <a:latin typeface="Open Sans" panose="020B0606030504020204" pitchFamily="34" charset="0"/>
-                <a:ea typeface="Times New Roman" panose="02020603050405020304" pitchFamily="18" charset="0"/>
-              </a:rPr>
-              <a:t>lorem</a:t>
-            </a:r>
-            <a:r>
-              <a:rPr lang="fr-CA" sz="1800" dirty="0">
-                <a:solidFill>
-                  <a:srgbClr val="000000"/>
-                </a:solidFill>
-                <a:effectLst/>
-                <a:latin typeface="Open Sans" panose="020B0606030504020204" pitchFamily="34" charset="0"/>
-                <a:ea typeface="Times New Roman" panose="02020603050405020304" pitchFamily="18" charset="0"/>
-              </a:rPr>
-              <a:t>. Integer </a:t>
-            </a:r>
-            <a:r>
-              <a:rPr lang="fr-CA" sz="1800" dirty="0" err="1">
-                <a:solidFill>
-                  <a:srgbClr val="000000"/>
-                </a:solidFill>
-                <a:effectLst/>
-                <a:latin typeface="Open Sans" panose="020B0606030504020204" pitchFamily="34" charset="0"/>
-                <a:ea typeface="Times New Roman" panose="02020603050405020304" pitchFamily="18" charset="0"/>
-              </a:rPr>
-              <a:t>condimentum</a:t>
-            </a:r>
-            <a:r>
-              <a:rPr lang="fr-CA" sz="1800" dirty="0">
-                <a:solidFill>
-                  <a:srgbClr val="000000"/>
-                </a:solidFill>
-                <a:effectLst/>
-                <a:latin typeface="Open Sans" panose="020B0606030504020204" pitchFamily="34" charset="0"/>
-                <a:ea typeface="Times New Roman" panose="02020603050405020304" pitchFamily="18" charset="0"/>
-              </a:rPr>
-              <a:t> </a:t>
-            </a:r>
-            <a:r>
-              <a:rPr lang="fr-CA" sz="1800" dirty="0" err="1">
-                <a:solidFill>
-                  <a:srgbClr val="000000"/>
-                </a:solidFill>
-                <a:effectLst/>
-                <a:latin typeface="Open Sans" panose="020B0606030504020204" pitchFamily="34" charset="0"/>
-                <a:ea typeface="Times New Roman" panose="02020603050405020304" pitchFamily="18" charset="0"/>
-              </a:rPr>
-              <a:t>gravida</a:t>
-            </a:r>
-            <a:r>
-              <a:rPr lang="fr-CA" sz="1800" dirty="0">
-                <a:solidFill>
-                  <a:srgbClr val="000000"/>
-                </a:solidFill>
-                <a:effectLst/>
-                <a:latin typeface="Open Sans" panose="020B0606030504020204" pitchFamily="34" charset="0"/>
-                <a:ea typeface="Times New Roman" panose="02020603050405020304" pitchFamily="18" charset="0"/>
-              </a:rPr>
-              <a:t> </a:t>
-            </a:r>
-            <a:r>
-              <a:rPr lang="fr-CA" sz="1800" dirty="0" err="1">
-                <a:solidFill>
-                  <a:srgbClr val="000000"/>
-                </a:solidFill>
-                <a:effectLst/>
-                <a:latin typeface="Open Sans" panose="020B0606030504020204" pitchFamily="34" charset="0"/>
-                <a:ea typeface="Times New Roman" panose="02020603050405020304" pitchFamily="18" charset="0"/>
-              </a:rPr>
-              <a:t>neque</a:t>
-            </a:r>
-            <a:r>
-              <a:rPr lang="fr-CA" sz="1800" dirty="0">
-                <a:solidFill>
-                  <a:srgbClr val="000000"/>
-                </a:solidFill>
-                <a:effectLst/>
-                <a:latin typeface="Open Sans" panose="020B0606030504020204" pitchFamily="34" charset="0"/>
-                <a:ea typeface="Times New Roman" panose="02020603050405020304" pitchFamily="18" charset="0"/>
-              </a:rPr>
-              <a:t>, et pretium est </a:t>
-            </a:r>
-            <a:r>
-              <a:rPr lang="fr-CA" sz="1800" dirty="0" err="1">
-                <a:solidFill>
-                  <a:srgbClr val="000000"/>
-                </a:solidFill>
-                <a:effectLst/>
-                <a:latin typeface="Open Sans" panose="020B0606030504020204" pitchFamily="34" charset="0"/>
-                <a:ea typeface="Times New Roman" panose="02020603050405020304" pitchFamily="18" charset="0"/>
-              </a:rPr>
-              <a:t>convallis</a:t>
-            </a:r>
-            <a:r>
-              <a:rPr lang="fr-CA" sz="1800" dirty="0">
-                <a:solidFill>
-                  <a:srgbClr val="000000"/>
-                </a:solidFill>
-                <a:effectLst/>
-                <a:latin typeface="Open Sans" panose="020B0606030504020204" pitchFamily="34" charset="0"/>
-                <a:ea typeface="Times New Roman" panose="02020603050405020304" pitchFamily="18" charset="0"/>
-              </a:rPr>
-              <a:t> nec. Ut </a:t>
-            </a:r>
-            <a:r>
-              <a:rPr lang="fr-CA" sz="1800" dirty="0" err="1">
-                <a:solidFill>
-                  <a:srgbClr val="000000"/>
-                </a:solidFill>
-                <a:effectLst/>
-                <a:latin typeface="Open Sans" panose="020B0606030504020204" pitchFamily="34" charset="0"/>
-                <a:ea typeface="Times New Roman" panose="02020603050405020304" pitchFamily="18" charset="0"/>
-              </a:rPr>
-              <a:t>sit</a:t>
-            </a:r>
-            <a:r>
-              <a:rPr lang="fr-CA" sz="1800" dirty="0">
-                <a:solidFill>
-                  <a:srgbClr val="000000"/>
-                </a:solidFill>
-                <a:effectLst/>
-                <a:latin typeface="Open Sans" panose="020B0606030504020204" pitchFamily="34" charset="0"/>
-                <a:ea typeface="Times New Roman" panose="02020603050405020304" pitchFamily="18" charset="0"/>
-              </a:rPr>
-              <a:t> </a:t>
-            </a:r>
-            <a:r>
-              <a:rPr lang="fr-CA" sz="1800" dirty="0" err="1">
-                <a:solidFill>
-                  <a:srgbClr val="000000"/>
-                </a:solidFill>
-                <a:effectLst/>
-                <a:latin typeface="Open Sans" panose="020B0606030504020204" pitchFamily="34" charset="0"/>
-                <a:ea typeface="Times New Roman" panose="02020603050405020304" pitchFamily="18" charset="0"/>
-              </a:rPr>
-              <a:t>amet</a:t>
-            </a:r>
-            <a:r>
-              <a:rPr lang="fr-CA" sz="1800" dirty="0">
-                <a:solidFill>
-                  <a:srgbClr val="000000"/>
-                </a:solidFill>
-                <a:effectLst/>
-                <a:latin typeface="Open Sans" panose="020B0606030504020204" pitchFamily="34" charset="0"/>
-                <a:ea typeface="Times New Roman" panose="02020603050405020304" pitchFamily="18" charset="0"/>
-              </a:rPr>
-              <a:t> ipsum non </a:t>
-            </a:r>
-            <a:r>
-              <a:rPr lang="fr-CA" sz="1800" dirty="0" err="1">
-                <a:solidFill>
-                  <a:srgbClr val="000000"/>
-                </a:solidFill>
-                <a:effectLst/>
-                <a:latin typeface="Open Sans" panose="020B0606030504020204" pitchFamily="34" charset="0"/>
-                <a:ea typeface="Times New Roman" panose="02020603050405020304" pitchFamily="18" charset="0"/>
-              </a:rPr>
-              <a:t>sem</a:t>
-            </a:r>
-            <a:r>
-              <a:rPr lang="fr-CA" sz="1800" dirty="0">
-                <a:solidFill>
-                  <a:srgbClr val="000000"/>
-                </a:solidFill>
-                <a:effectLst/>
-                <a:latin typeface="Open Sans" panose="020B0606030504020204" pitchFamily="34" charset="0"/>
-                <a:ea typeface="Times New Roman" panose="02020603050405020304" pitchFamily="18" charset="0"/>
-              </a:rPr>
-              <a:t> </a:t>
-            </a:r>
-            <a:r>
-              <a:rPr lang="fr-CA" sz="1800" dirty="0" err="1">
-                <a:solidFill>
-                  <a:srgbClr val="000000"/>
-                </a:solidFill>
-                <a:effectLst/>
-                <a:latin typeface="Open Sans" panose="020B0606030504020204" pitchFamily="34" charset="0"/>
-                <a:ea typeface="Times New Roman" panose="02020603050405020304" pitchFamily="18" charset="0"/>
-              </a:rPr>
-              <a:t>feugiat</a:t>
-            </a:r>
-            <a:r>
-              <a:rPr lang="fr-CA" sz="1800" dirty="0">
-                <a:solidFill>
-                  <a:srgbClr val="000000"/>
-                </a:solidFill>
-                <a:effectLst/>
-                <a:latin typeface="Open Sans" panose="020B0606030504020204" pitchFamily="34" charset="0"/>
-                <a:ea typeface="Times New Roman" panose="02020603050405020304" pitchFamily="18" charset="0"/>
-              </a:rPr>
-              <a:t> </a:t>
-            </a:r>
-            <a:r>
-              <a:rPr lang="fr-CA" sz="1800" dirty="0" err="1">
-                <a:solidFill>
-                  <a:srgbClr val="000000"/>
-                </a:solidFill>
-                <a:effectLst/>
-                <a:latin typeface="Open Sans" panose="020B0606030504020204" pitchFamily="34" charset="0"/>
-                <a:ea typeface="Times New Roman" panose="02020603050405020304" pitchFamily="18" charset="0"/>
-              </a:rPr>
-              <a:t>congue</a:t>
-            </a:r>
-            <a:r>
-              <a:rPr lang="fr-CA" sz="1800" dirty="0">
-                <a:solidFill>
-                  <a:srgbClr val="000000"/>
-                </a:solidFill>
-                <a:effectLst/>
-                <a:latin typeface="Open Sans" panose="020B0606030504020204" pitchFamily="34" charset="0"/>
-                <a:ea typeface="Times New Roman" panose="02020603050405020304" pitchFamily="18" charset="0"/>
-              </a:rPr>
-              <a:t>. </a:t>
-            </a:r>
-            <a:r>
-              <a:rPr lang="fr-CA" sz="1800" dirty="0" err="1">
-                <a:solidFill>
-                  <a:srgbClr val="000000"/>
-                </a:solidFill>
-                <a:effectLst/>
-                <a:latin typeface="Open Sans" panose="020B0606030504020204" pitchFamily="34" charset="0"/>
-                <a:ea typeface="Times New Roman" panose="02020603050405020304" pitchFamily="18" charset="0"/>
-              </a:rPr>
-              <a:t>Aliquam</a:t>
-            </a:r>
-            <a:r>
-              <a:rPr lang="fr-CA" sz="1800" dirty="0">
-                <a:solidFill>
-                  <a:srgbClr val="000000"/>
-                </a:solidFill>
-                <a:effectLst/>
-                <a:latin typeface="Open Sans" panose="020B0606030504020204" pitchFamily="34" charset="0"/>
-                <a:ea typeface="Times New Roman" panose="02020603050405020304" pitchFamily="18" charset="0"/>
-              </a:rPr>
-              <a:t> mi </a:t>
-            </a:r>
-            <a:r>
-              <a:rPr lang="fr-CA" sz="1800" dirty="0" err="1">
-                <a:solidFill>
-                  <a:srgbClr val="000000"/>
-                </a:solidFill>
-                <a:effectLst/>
-                <a:latin typeface="Open Sans" panose="020B0606030504020204" pitchFamily="34" charset="0"/>
-                <a:ea typeface="Times New Roman" panose="02020603050405020304" pitchFamily="18" charset="0"/>
-              </a:rPr>
-              <a:t>enim</a:t>
-            </a:r>
-            <a:r>
-              <a:rPr lang="fr-CA" sz="1800" dirty="0">
-                <a:solidFill>
-                  <a:srgbClr val="000000"/>
-                </a:solidFill>
-                <a:effectLst/>
-                <a:latin typeface="Open Sans" panose="020B0606030504020204" pitchFamily="34" charset="0"/>
-                <a:ea typeface="Times New Roman" panose="02020603050405020304" pitchFamily="18" charset="0"/>
-              </a:rPr>
-              <a:t>, </a:t>
-            </a:r>
-            <a:r>
-              <a:rPr lang="fr-CA" sz="1800" dirty="0" err="1">
-                <a:solidFill>
-                  <a:srgbClr val="000000"/>
-                </a:solidFill>
-                <a:effectLst/>
-                <a:latin typeface="Open Sans" panose="020B0606030504020204" pitchFamily="34" charset="0"/>
-                <a:ea typeface="Times New Roman" panose="02020603050405020304" pitchFamily="18" charset="0"/>
-              </a:rPr>
-              <a:t>congue</a:t>
-            </a:r>
-            <a:r>
-              <a:rPr lang="fr-CA" sz="1800" dirty="0">
-                <a:solidFill>
-                  <a:srgbClr val="000000"/>
-                </a:solidFill>
-                <a:effectLst/>
-                <a:latin typeface="Open Sans" panose="020B0606030504020204" pitchFamily="34" charset="0"/>
-                <a:ea typeface="Times New Roman" panose="02020603050405020304" pitchFamily="18" charset="0"/>
-              </a:rPr>
-              <a:t> </a:t>
-            </a:r>
-            <a:r>
-              <a:rPr lang="fr-CA" sz="1800" dirty="0" err="1">
-                <a:solidFill>
-                  <a:srgbClr val="000000"/>
-                </a:solidFill>
-                <a:effectLst/>
-                <a:latin typeface="Open Sans" panose="020B0606030504020204" pitchFamily="34" charset="0"/>
-                <a:ea typeface="Times New Roman" panose="02020603050405020304" pitchFamily="18" charset="0"/>
-              </a:rPr>
-              <a:t>volutpat</a:t>
-            </a:r>
-            <a:r>
-              <a:rPr lang="fr-CA" sz="1800" dirty="0">
-                <a:solidFill>
-                  <a:srgbClr val="000000"/>
-                </a:solidFill>
-                <a:effectLst/>
-                <a:latin typeface="Open Sans" panose="020B0606030504020204" pitchFamily="34" charset="0"/>
-                <a:ea typeface="Times New Roman" panose="02020603050405020304" pitchFamily="18" charset="0"/>
-              </a:rPr>
-              <a:t> libero </a:t>
-            </a:r>
-            <a:r>
-              <a:rPr lang="fr-CA" sz="1800" dirty="0" err="1">
-                <a:solidFill>
-                  <a:srgbClr val="000000"/>
-                </a:solidFill>
-                <a:effectLst/>
-                <a:latin typeface="Open Sans" panose="020B0606030504020204" pitchFamily="34" charset="0"/>
-                <a:ea typeface="Times New Roman" panose="02020603050405020304" pitchFamily="18" charset="0"/>
-              </a:rPr>
-              <a:t>sit</a:t>
-            </a:r>
-            <a:r>
-              <a:rPr lang="fr-CA" sz="1800" dirty="0">
-                <a:solidFill>
-                  <a:srgbClr val="000000"/>
-                </a:solidFill>
-                <a:effectLst/>
-                <a:latin typeface="Open Sans" panose="020B0606030504020204" pitchFamily="34" charset="0"/>
-                <a:ea typeface="Times New Roman" panose="02020603050405020304" pitchFamily="18" charset="0"/>
-              </a:rPr>
-              <a:t> </a:t>
-            </a:r>
-            <a:r>
-              <a:rPr lang="fr-CA" sz="1800" dirty="0" err="1">
-                <a:solidFill>
-                  <a:srgbClr val="000000"/>
-                </a:solidFill>
-                <a:effectLst/>
-                <a:latin typeface="Open Sans" panose="020B0606030504020204" pitchFamily="34" charset="0"/>
-                <a:ea typeface="Times New Roman" panose="02020603050405020304" pitchFamily="18" charset="0"/>
-              </a:rPr>
-              <a:t>amet</a:t>
-            </a:r>
-            <a:r>
-              <a:rPr lang="fr-CA" sz="1800" dirty="0">
-                <a:solidFill>
-                  <a:srgbClr val="000000"/>
-                </a:solidFill>
-                <a:effectLst/>
-                <a:latin typeface="Open Sans" panose="020B0606030504020204" pitchFamily="34" charset="0"/>
-                <a:ea typeface="Times New Roman" panose="02020603050405020304" pitchFamily="18" charset="0"/>
-              </a:rPr>
-              <a:t>, </a:t>
-            </a:r>
-            <a:r>
-              <a:rPr lang="fr-CA" sz="1800" dirty="0" err="1">
-                <a:solidFill>
-                  <a:srgbClr val="000000"/>
-                </a:solidFill>
-                <a:effectLst/>
-                <a:latin typeface="Open Sans" panose="020B0606030504020204" pitchFamily="34" charset="0"/>
-                <a:ea typeface="Times New Roman" panose="02020603050405020304" pitchFamily="18" charset="0"/>
-              </a:rPr>
-              <a:t>vulputate</a:t>
-            </a:r>
-            <a:r>
-              <a:rPr lang="fr-CA" sz="1800" dirty="0">
-                <a:solidFill>
-                  <a:srgbClr val="000000"/>
-                </a:solidFill>
-                <a:effectLst/>
-                <a:latin typeface="Open Sans" panose="020B0606030504020204" pitchFamily="34" charset="0"/>
-                <a:ea typeface="Times New Roman" panose="02020603050405020304" pitchFamily="18" charset="0"/>
-              </a:rPr>
-              <a:t> </a:t>
-            </a:r>
-            <a:r>
-              <a:rPr lang="fr-CA" sz="1800" dirty="0" err="1">
-                <a:solidFill>
-                  <a:srgbClr val="000000"/>
-                </a:solidFill>
-                <a:effectLst/>
-                <a:latin typeface="Open Sans" panose="020B0606030504020204" pitchFamily="34" charset="0"/>
-                <a:ea typeface="Times New Roman" panose="02020603050405020304" pitchFamily="18" charset="0"/>
-              </a:rPr>
-              <a:t>vestibulum</a:t>
-            </a:r>
-            <a:r>
-              <a:rPr lang="fr-CA" sz="1800" dirty="0">
-                <a:solidFill>
-                  <a:srgbClr val="000000"/>
-                </a:solidFill>
-                <a:effectLst/>
-                <a:latin typeface="Open Sans" panose="020B0606030504020204" pitchFamily="34" charset="0"/>
-                <a:ea typeface="Times New Roman" panose="02020603050405020304" pitchFamily="18" charset="0"/>
-              </a:rPr>
-              <a:t> ante.</a:t>
-            </a:r>
-            <a:endParaRPr lang="en-CA" sz="1800" dirty="0">
-              <a:effectLst/>
-              <a:latin typeface="Times New Roman" panose="02020603050405020304" pitchFamily="18" charset="0"/>
-              <a:ea typeface="Times New Roman" panose="02020603050405020304" pitchFamily="18" charset="0"/>
-            </a:endParaRPr>
-          </a:p>
-        </p:txBody>
-      </p:sp>
+        </p:nvGraphicFramePr>
+        <p:xfrm>
+          <a:off x="838200" y="1825625"/>
+          <a:ext cx="10515597" cy="1112520"/>
+        </p:xfrm>
+        <a:graphic>
+          <a:graphicData uri="http://schemas.openxmlformats.org/drawingml/2006/table">
+            <a:tbl>
+              <a:tblPr firstRow="1" bandRow="1">
+                <a:tableStyleId>{5C22544A-7EE6-4342-B048-85BDC9FD1C3A}</a:tableStyleId>
+              </a:tblPr>
+              <a:tblGrid>
+                <a:gridCol w="3505199">
+                  <a:extLst>
+                    <a:ext uri="{9D8B030D-6E8A-4147-A177-3AD203B41FA5}">
+                      <a16:colId xmlns:a16="http://schemas.microsoft.com/office/drawing/2014/main" val="27275150"/>
+                    </a:ext>
+                  </a:extLst>
+                </a:gridCol>
+                <a:gridCol w="3505199">
+                  <a:extLst>
+                    <a:ext uri="{9D8B030D-6E8A-4147-A177-3AD203B41FA5}">
+                      <a16:colId xmlns:a16="http://schemas.microsoft.com/office/drawing/2014/main" val="1497748746"/>
+                    </a:ext>
+                  </a:extLst>
+                </a:gridCol>
+                <a:gridCol w="3505199">
+                  <a:extLst>
+                    <a:ext uri="{9D8B030D-6E8A-4147-A177-3AD203B41FA5}">
+                      <a16:colId xmlns:a16="http://schemas.microsoft.com/office/drawing/2014/main" val="2760423242"/>
+                    </a:ext>
+                  </a:extLst>
+                </a:gridCol>
+              </a:tblGrid>
+              <a:tr h="370840">
+                <a:tc>
+                  <a:txBody>
+                    <a:bodyPr/>
+                    <a:lstStyle/>
+                    <a:p>
+                      <a:r>
+                        <a:rPr lang="en-CA" dirty="0"/>
+                        <a:t>C1</a:t>
+                      </a:r>
+                    </a:p>
+                  </a:txBody>
+                  <a:tcPr/>
+                </a:tc>
+                <a:tc>
+                  <a:txBody>
+                    <a:bodyPr/>
+                    <a:lstStyle/>
+                    <a:p>
+                      <a:r>
+                        <a:rPr lang="en-CA" dirty="0"/>
+                        <a:t>C2</a:t>
+                      </a:r>
+                    </a:p>
+                  </a:txBody>
+                  <a:tcPr/>
+                </a:tc>
+                <a:tc>
+                  <a:txBody>
+                    <a:bodyPr/>
+                    <a:lstStyle/>
+                    <a:p>
+                      <a:r>
+                        <a:rPr lang="en-CA" dirty="0"/>
+                        <a:t>C3</a:t>
+                      </a:r>
+                    </a:p>
+                  </a:txBody>
+                  <a:tcPr/>
+                </a:tc>
+                <a:extLst>
+                  <a:ext uri="{0D108BD9-81ED-4DB2-BD59-A6C34878D82A}">
+                    <a16:rowId xmlns:a16="http://schemas.microsoft.com/office/drawing/2014/main" val="2657001792"/>
+                  </a:ext>
+                </a:extLst>
+              </a:tr>
+              <a:tr h="370840">
+                <a:tc>
+                  <a:txBody>
+                    <a:bodyPr/>
+                    <a:lstStyle/>
+                    <a:p>
+                      <a:r>
+                        <a:rPr lang="en-CA" dirty="0" err="1"/>
+                        <a:t>aA</a:t>
+                      </a:r>
+                      <a:endParaRPr lang="en-CA" dirty="0"/>
+                    </a:p>
+                  </a:txBody>
+                  <a:tcPr/>
+                </a:tc>
+                <a:tc>
+                  <a:txBody>
+                    <a:bodyPr/>
+                    <a:lstStyle/>
+                    <a:p>
+                      <a:r>
+                        <a:rPr lang="en-CA" dirty="0" err="1"/>
+                        <a:t>bB</a:t>
+                      </a:r>
+                      <a:endParaRPr lang="en-CA" dirty="0"/>
+                    </a:p>
+                  </a:txBody>
+                  <a:tcPr/>
+                </a:tc>
+                <a:tc>
+                  <a:txBody>
+                    <a:bodyPr/>
+                    <a:lstStyle/>
+                    <a:p>
+                      <a:r>
+                        <a:rPr lang="en-CA" dirty="0" err="1"/>
+                        <a:t>cC</a:t>
+                      </a:r>
+                      <a:endParaRPr lang="en-CA" dirty="0"/>
+                    </a:p>
+                  </a:txBody>
+                  <a:tcPr/>
+                </a:tc>
+                <a:extLst>
+                  <a:ext uri="{0D108BD9-81ED-4DB2-BD59-A6C34878D82A}">
+                    <a16:rowId xmlns:a16="http://schemas.microsoft.com/office/drawing/2014/main" val="3791630965"/>
+                  </a:ext>
+                </a:extLst>
+              </a:tr>
+              <a:tr h="370840">
+                <a:tc>
+                  <a:txBody>
+                    <a:bodyPr/>
+                    <a:lstStyle/>
+                    <a:p>
+                      <a:r>
+                        <a:rPr lang="en-CA" dirty="0" err="1"/>
+                        <a:t>dD</a:t>
+                      </a:r>
+                      <a:endParaRPr lang="en-CA" dirty="0"/>
+                    </a:p>
+                  </a:txBody>
+                  <a:tcPr/>
+                </a:tc>
+                <a:tc>
+                  <a:txBody>
+                    <a:bodyPr/>
+                    <a:lstStyle/>
+                    <a:p>
+                      <a:r>
+                        <a:rPr lang="en-CA" dirty="0" err="1"/>
+                        <a:t>eE</a:t>
+                      </a:r>
+                      <a:endParaRPr lang="en-CA" dirty="0"/>
+                    </a:p>
+                  </a:txBody>
+                  <a:tcPr/>
+                </a:tc>
+                <a:tc>
+                  <a:txBody>
+                    <a:bodyPr/>
+                    <a:lstStyle/>
+                    <a:p>
+                      <a:r>
+                        <a:rPr lang="en-CA" dirty="0" err="1"/>
+                        <a:t>fF</a:t>
+                      </a:r>
+                      <a:endParaRPr lang="en-CA" dirty="0"/>
+                    </a:p>
+                  </a:txBody>
+                  <a:tcPr/>
+                </a:tc>
+                <a:extLst>
+                  <a:ext uri="{0D108BD9-81ED-4DB2-BD59-A6C34878D82A}">
+                    <a16:rowId xmlns:a16="http://schemas.microsoft.com/office/drawing/2014/main" val="377542340"/>
+                  </a:ext>
+                </a:extLst>
+              </a:tr>
+            </a:tbl>
+          </a:graphicData>
+        </a:graphic>
+      </p:graphicFrame>
     </p:spTree>
     <p:extLst>
       <p:ext uri="{BB962C8B-B14F-4D97-AF65-F5344CB8AC3E}">
@@ -10918,6 +8236,102 @@
     <p:extLst>
       <p:ext uri="{BB962C8B-B14F-4D97-AF65-F5344CB8AC3E}">
         <p14:creationId xmlns:p14="http://schemas.microsoft.com/office/powerpoint/2010/main" val="1781186679"/>
+      </p:ext>
+    </p:extLst>
+  </p:cSld>
+  <p:clrMapOvr>
+    <a:masterClrMapping/>
+  </p:clrMapOvr>
+</p:sld>
+</file>
+
+<file path=ppt/slides/slide5.xml><?xml version="1.0" encoding="utf-8"?>
+<p:sld xmlns:a="http://schemas.openxmlformats.org/drawingml/2006/main" xmlns:r="http://schemas.openxmlformats.org/officeDocument/2006/relationships" xmlns:p="http://schemas.openxmlformats.org/presentationml/2006/main">
+  <p:cSld>
+    <p:spTree>
+      <p:nvGrpSpPr>
+        <p:cNvPr id="1" name=""/>
+        <p:cNvGrpSpPr/>
+        <p:nvPr/>
+      </p:nvGrpSpPr>
+      <p:grpSpPr>
+        <a:xfrm>
+          <a:off x="0" y="0"/>
+          <a:ext cx="0" cy="0"/>
+          <a:chOff x="0" y="0"/>
+          <a:chExt cx="0" cy="0"/>
+        </a:xfrm>
+      </p:grpSpPr>
+      <p:sp>
+        <p:nvSpPr>
+          <p:cNvPr id="2" name="Title 1">
+            <a:extLst>
+              <a:ext uri="{FF2B5EF4-FFF2-40B4-BE49-F238E27FC236}">
+                <a16:creationId xmlns:a16="http://schemas.microsoft.com/office/drawing/2014/main" id="{59173C97-2953-05AE-1BD8-C7C4E75E68FE}"/>
+              </a:ext>
+            </a:extLst>
+          </p:cNvPr>
+          <p:cNvSpPr>
+            <a:spLocks noGrp="1"/>
+          </p:cNvSpPr>
+          <p:nvPr>
+            <p:ph type="title"/>
+          </p:nvPr>
+        </p:nvSpPr>
+        <p:spPr/>
+        <p:txBody>
+          <a:bodyPr/>
+          <a:lstStyle/>
+          <a:p>
+            <a:r>
+              <a:rPr lang="en-CA" dirty="0"/>
+              <a:t>Slide 4</a:t>
+            </a:r>
+          </a:p>
+        </p:txBody>
+      </p:sp>
+      <p:pic>
+        <p:nvPicPr>
+          <p:cNvPr id="5" name="Content Placeholder 4" descr="Smiling face outline with solid fill">
+            <a:extLst>
+              <a:ext uri="{FF2B5EF4-FFF2-40B4-BE49-F238E27FC236}">
+                <a16:creationId xmlns:a16="http://schemas.microsoft.com/office/drawing/2014/main" id="{5DB13C01-2479-5518-6964-DAD9832635F7}"/>
+              </a:ext>
+            </a:extLst>
+          </p:cNvPr>
+          <p:cNvPicPr>
+            <a:picLocks noGrp="1" noChangeAspect="1"/>
+          </p:cNvPicPr>
+          <p:nvPr>
+            <p:ph idx="1"/>
+          </p:nvPr>
+        </p:nvPicPr>
+        <p:blipFill>
+          <a:blip r:embed="rId2">
+            <a:extLst>
+              <a:ext uri="{28A0092B-C50C-407E-A947-70E740481C1C}">
+                <a14:useLocalDpi xmlns:a14="http://schemas.microsoft.com/office/drawing/2010/main" val="0"/>
+              </a:ext>
+              <a:ext uri="{96DAC541-7B7A-43D3-8B79-37D633B846F1}">
+                <asvg:svgBlip xmlns:asvg="http://schemas.microsoft.com/office/drawing/2016/SVG/main" r:embed="rId3"/>
+              </a:ext>
+            </a:extLst>
+          </a:blip>
+          <a:stretch>
+            <a:fillRect/>
+          </a:stretch>
+        </p:blipFill>
+        <p:spPr>
+          <a:xfrm>
+            <a:off x="5638800" y="3544094"/>
+            <a:ext cx="914400" cy="914400"/>
+          </a:xfrm>
+        </p:spPr>
+      </p:pic>
+    </p:spTree>
+    <p:extLst>
+      <p:ext uri="{BB962C8B-B14F-4D97-AF65-F5344CB8AC3E}">
+        <p14:creationId xmlns:p14="http://schemas.microsoft.com/office/powerpoint/2010/main" val="4227767891"/>
       </p:ext>
     </p:extLst>
   </p:cSld>

</xml_diff>